<commit_message>
prepare tutorial for 09/26
</commit_message>
<xml_diff>
--- a/lectures/Introduction.pptx
+++ b/lectures/Introduction.pptx
@@ -26,6 +26,7 @@
     <p:sldId id="271" r:id="rId21"/>
     <p:sldId id="272" r:id="rId22"/>
     <p:sldId id="273" r:id="rId23"/>
+    <p:sldId id="274" r:id="rId24"/>
   </p:sldIdLst>
   <p:sldSz cy="6858000" cx="9144000"/>
   <p:notesSz cx="6858000" cy="9144000"/>
@@ -274,7 +275,7 @@
       </p15:sldGuideLst>
     </p:ext>
     <p:ext uri="GoogleSlidesCustomDataVersion2">
-      <go:slidesCustomData xmlns:go="http://customooxmlschemas.google.com/" r:id="rId24" roundtripDataSignature="AMtx7mjjqfDQtj0IZ35SCK/1onMSYGWCtQ=="/>
+      <go:slidesCustomData xmlns:go="http://customooxmlschemas.google.com/" r:id="rId25" roundtripDataSignature="AMtx7mgIg8sgB/avgLOa4M8apLGn8vRndw=="/>
     </p:ext>
   </p:extLst>
 </p:presentation>
@@ -1992,6 +1993,16 @@
               </a:path>
             </a:pathLst>
           </a:custGeom>
+          <a:noFill/>
+          <a:ln cap="flat" cmpd="sng" w="12700">
+            <a:solidFill>
+              <a:srgbClr val="000000"/>
+            </a:solidFill>
+            <a:prstDash val="solid"/>
+            <a:round/>
+            <a:headEnd len="sm" w="sm" type="none"/>
+            <a:tailEnd len="sm" w="sm" type="none"/>
+          </a:ln>
         </p:spPr>
       </p:sp>
       <p:sp>
@@ -2010,6 +2021,10 @@
           <a:prstGeom prst="rect">
             <a:avLst/>
           </a:prstGeom>
+          <a:noFill/>
+          <a:ln>
+            <a:noFill/>
+          </a:ln>
         </p:spPr>
         <p:txBody>
           <a:bodyPr anchorCtr="0" anchor="t" bIns="45700" lIns="91425" spcFirstLastPara="1" rIns="91425" wrap="square" tIns="45700">
@@ -2018,12 +2033,16 @@
           <a:lstStyle/>
           <a:p>
             <a:pPr indent="0" lvl="0" marL="0" rtl="0" algn="l">
-              <a:spcBef>
-                <a:spcPts val="0"/>
-              </a:spcBef>
-              <a:spcAft>
-                <a:spcPts val="0"/>
-              </a:spcAft>
+              <a:lnSpc>
+                <a:spcPct val="100000"/>
+              </a:lnSpc>
+              <a:spcBef>
+                <a:spcPts val="0"/>
+              </a:spcBef>
+              <a:spcAft>
+                <a:spcPts val="0"/>
+              </a:spcAft>
+              <a:buSzPts val="1400"/>
               <a:buNone/>
             </a:pPr>
             <a:r>
@@ -2049,6 +2068,10 @@
           <a:prstGeom prst="rect">
             <a:avLst/>
           </a:prstGeom>
+          <a:noFill/>
+          <a:ln>
+            <a:noFill/>
+          </a:ln>
         </p:spPr>
         <p:txBody>
           <a:bodyPr anchorCtr="0" anchor="b" bIns="45700" lIns="91425" spcFirstLastPara="1" rIns="91425" wrap="square" tIns="45700">
@@ -2057,6 +2080,9 @@
           <a:lstStyle/>
           <a:p>
             <a:pPr indent="0" lvl="0" marL="0" rtl="0" algn="r">
+              <a:lnSpc>
+                <a:spcPct val="100000"/>
+              </a:lnSpc>
               <a:spcBef>
                 <a:spcPts val="0"/>
               </a:spcBef>
@@ -2136,6 +2162,16 @@
               </a:path>
             </a:pathLst>
           </a:custGeom>
+          <a:noFill/>
+          <a:ln cap="flat" cmpd="sng" w="12700">
+            <a:solidFill>
+              <a:srgbClr val="000000"/>
+            </a:solidFill>
+            <a:prstDash val="solid"/>
+            <a:round/>
+            <a:headEnd len="sm" w="sm" type="none"/>
+            <a:tailEnd len="sm" w="sm" type="none"/>
+          </a:ln>
         </p:spPr>
       </p:sp>
       <p:sp>
@@ -2154,6 +2190,10 @@
           <a:prstGeom prst="rect">
             <a:avLst/>
           </a:prstGeom>
+          <a:noFill/>
+          <a:ln>
+            <a:noFill/>
+          </a:ln>
         </p:spPr>
         <p:txBody>
           <a:bodyPr anchorCtr="0" anchor="t" bIns="45700" lIns="91425" spcFirstLastPara="1" rIns="91425" wrap="square" tIns="45700">
@@ -2162,12 +2202,16 @@
           <a:lstStyle/>
           <a:p>
             <a:pPr indent="0" lvl="0" marL="0" rtl="0" algn="l">
-              <a:spcBef>
-                <a:spcPts val="0"/>
-              </a:spcBef>
-              <a:spcAft>
-                <a:spcPts val="0"/>
-              </a:spcAft>
+              <a:lnSpc>
+                <a:spcPct val="100000"/>
+              </a:lnSpc>
+              <a:spcBef>
+                <a:spcPts val="0"/>
+              </a:spcBef>
+              <a:spcAft>
+                <a:spcPts val="0"/>
+              </a:spcAft>
+              <a:buSzPts val="1400"/>
               <a:buNone/>
             </a:pPr>
             <a:r>
@@ -2193,6 +2237,10 @@
           <a:prstGeom prst="rect">
             <a:avLst/>
           </a:prstGeom>
+          <a:noFill/>
+          <a:ln>
+            <a:noFill/>
+          </a:ln>
         </p:spPr>
         <p:txBody>
           <a:bodyPr anchorCtr="0" anchor="b" bIns="45700" lIns="91425" spcFirstLastPara="1" rIns="91425" wrap="square" tIns="45700">
@@ -2201,6 +2249,9 @@
           <a:lstStyle/>
           <a:p>
             <a:pPr indent="0" lvl="0" marL="0" rtl="0" algn="r">
+              <a:lnSpc>
+                <a:spcPct val="100000"/>
+              </a:lnSpc>
               <a:spcBef>
                 <a:spcPts val="0"/>
               </a:spcBef>
@@ -2280,6 +2331,16 @@
               </a:path>
             </a:pathLst>
           </a:custGeom>
+          <a:noFill/>
+          <a:ln cap="flat" cmpd="sng" w="12700">
+            <a:solidFill>
+              <a:srgbClr val="000000"/>
+            </a:solidFill>
+            <a:prstDash val="solid"/>
+            <a:round/>
+            <a:headEnd len="sm" w="sm" type="none"/>
+            <a:tailEnd len="sm" w="sm" type="none"/>
+          </a:ln>
         </p:spPr>
       </p:sp>
       <p:sp>
@@ -2298,6 +2359,10 @@
           <a:prstGeom prst="rect">
             <a:avLst/>
           </a:prstGeom>
+          <a:noFill/>
+          <a:ln>
+            <a:noFill/>
+          </a:ln>
         </p:spPr>
         <p:txBody>
           <a:bodyPr anchorCtr="0" anchor="t" bIns="45700" lIns="91425" spcFirstLastPara="1" rIns="91425" wrap="square" tIns="45700">
@@ -2306,12 +2371,16 @@
           <a:lstStyle/>
           <a:p>
             <a:pPr indent="0" lvl="0" marL="0" rtl="0" algn="l">
-              <a:spcBef>
-                <a:spcPts val="0"/>
-              </a:spcBef>
-              <a:spcAft>
-                <a:spcPts val="0"/>
-              </a:spcAft>
+              <a:lnSpc>
+                <a:spcPct val="100000"/>
+              </a:lnSpc>
+              <a:spcBef>
+                <a:spcPts val="0"/>
+              </a:spcBef>
+              <a:spcAft>
+                <a:spcPts val="0"/>
+              </a:spcAft>
+              <a:buSzPts val="1400"/>
               <a:buNone/>
             </a:pPr>
             <a:r>
@@ -2337,6 +2406,10 @@
           <a:prstGeom prst="rect">
             <a:avLst/>
           </a:prstGeom>
+          <a:noFill/>
+          <a:ln>
+            <a:noFill/>
+          </a:ln>
         </p:spPr>
         <p:txBody>
           <a:bodyPr anchorCtr="0" anchor="b" bIns="45700" lIns="91425" spcFirstLastPara="1" rIns="91425" wrap="square" tIns="45700">
@@ -2345,6 +2418,9 @@
           <a:lstStyle/>
           <a:p>
             <a:pPr indent="0" lvl="0" marL="0" rtl="0" algn="r">
+              <a:lnSpc>
+                <a:spcPct val="100000"/>
+              </a:lnSpc>
               <a:spcBef>
                 <a:spcPts val="0"/>
               </a:spcBef>
@@ -2424,6 +2500,16 @@
               </a:path>
             </a:pathLst>
           </a:custGeom>
+          <a:noFill/>
+          <a:ln cap="flat" cmpd="sng" w="12700">
+            <a:solidFill>
+              <a:srgbClr val="000000"/>
+            </a:solidFill>
+            <a:prstDash val="solid"/>
+            <a:round/>
+            <a:headEnd len="sm" w="sm" type="none"/>
+            <a:tailEnd len="sm" w="sm" type="none"/>
+          </a:ln>
         </p:spPr>
       </p:sp>
       <p:sp>
@@ -2442,6 +2528,10 @@
           <a:prstGeom prst="rect">
             <a:avLst/>
           </a:prstGeom>
+          <a:noFill/>
+          <a:ln>
+            <a:noFill/>
+          </a:ln>
         </p:spPr>
         <p:txBody>
           <a:bodyPr anchorCtr="0" anchor="t" bIns="45700" lIns="91425" spcFirstLastPara="1" rIns="91425" wrap="square" tIns="45700">
@@ -2450,12 +2540,16 @@
           <a:lstStyle/>
           <a:p>
             <a:pPr indent="0" lvl="0" marL="0" rtl="0" algn="l">
-              <a:spcBef>
-                <a:spcPts val="0"/>
-              </a:spcBef>
-              <a:spcAft>
-                <a:spcPts val="0"/>
-              </a:spcAft>
+              <a:lnSpc>
+                <a:spcPct val="100000"/>
+              </a:lnSpc>
+              <a:spcBef>
+                <a:spcPts val="0"/>
+              </a:spcBef>
+              <a:spcAft>
+                <a:spcPts val="0"/>
+              </a:spcAft>
+              <a:buSzPts val="1400"/>
               <a:buNone/>
             </a:pPr>
             <a:r>
@@ -2481,6 +2575,10 @@
           <a:prstGeom prst="rect">
             <a:avLst/>
           </a:prstGeom>
+          <a:noFill/>
+          <a:ln>
+            <a:noFill/>
+          </a:ln>
         </p:spPr>
         <p:txBody>
           <a:bodyPr anchorCtr="0" anchor="b" bIns="45700" lIns="91425" spcFirstLastPara="1" rIns="91425" wrap="square" tIns="45700">
@@ -2489,6 +2587,9 @@
           <a:lstStyle/>
           <a:p>
             <a:pPr indent="0" lvl="0" marL="0" rtl="0" algn="r">
+              <a:lnSpc>
+                <a:spcPct val="100000"/>
+              </a:lnSpc>
               <a:spcBef>
                 <a:spcPts val="0"/>
               </a:spcBef>
@@ -2568,6 +2669,16 @@
               </a:path>
             </a:pathLst>
           </a:custGeom>
+          <a:noFill/>
+          <a:ln cap="flat" cmpd="sng" w="12700">
+            <a:solidFill>
+              <a:srgbClr val="000000"/>
+            </a:solidFill>
+            <a:prstDash val="solid"/>
+            <a:round/>
+            <a:headEnd len="sm" w="sm" type="none"/>
+            <a:tailEnd len="sm" w="sm" type="none"/>
+          </a:ln>
         </p:spPr>
       </p:sp>
       <p:sp>
@@ -2586,6 +2697,10 @@
           <a:prstGeom prst="rect">
             <a:avLst/>
           </a:prstGeom>
+          <a:noFill/>
+          <a:ln>
+            <a:noFill/>
+          </a:ln>
         </p:spPr>
         <p:txBody>
           <a:bodyPr anchorCtr="0" anchor="t" bIns="45700" lIns="91425" spcFirstLastPara="1" rIns="91425" wrap="square" tIns="45700">
@@ -2594,12 +2709,16 @@
           <a:lstStyle/>
           <a:p>
             <a:pPr indent="0" lvl="0" marL="0" rtl="0" algn="l">
-              <a:spcBef>
-                <a:spcPts val="0"/>
-              </a:spcBef>
-              <a:spcAft>
-                <a:spcPts val="0"/>
-              </a:spcAft>
+              <a:lnSpc>
+                <a:spcPct val="100000"/>
+              </a:lnSpc>
+              <a:spcBef>
+                <a:spcPts val="0"/>
+              </a:spcBef>
+              <a:spcAft>
+                <a:spcPts val="0"/>
+              </a:spcAft>
+              <a:buSzPts val="1400"/>
               <a:buNone/>
             </a:pPr>
             <a:r>
@@ -2625,6 +2744,10 @@
           <a:prstGeom prst="rect">
             <a:avLst/>
           </a:prstGeom>
+          <a:noFill/>
+          <a:ln>
+            <a:noFill/>
+          </a:ln>
         </p:spPr>
         <p:txBody>
           <a:bodyPr anchorCtr="0" anchor="b" bIns="45700" lIns="91425" spcFirstLastPara="1" rIns="91425" wrap="square" tIns="45700">
@@ -2633,6 +2756,9 @@
           <a:lstStyle/>
           <a:p>
             <a:pPr indent="0" lvl="0" marL="0" rtl="0" algn="r">
+              <a:lnSpc>
+                <a:spcPct val="100000"/>
+              </a:lnSpc>
               <a:spcBef>
                 <a:spcPts val="0"/>
               </a:spcBef>
@@ -2712,6 +2838,16 @@
               </a:path>
             </a:pathLst>
           </a:custGeom>
+          <a:noFill/>
+          <a:ln cap="flat" cmpd="sng" w="12700">
+            <a:solidFill>
+              <a:srgbClr val="000000"/>
+            </a:solidFill>
+            <a:prstDash val="solid"/>
+            <a:round/>
+            <a:headEnd len="sm" w="sm" type="none"/>
+            <a:tailEnd len="sm" w="sm" type="none"/>
+          </a:ln>
         </p:spPr>
       </p:sp>
       <p:sp>
@@ -2730,6 +2866,10 @@
           <a:prstGeom prst="rect">
             <a:avLst/>
           </a:prstGeom>
+          <a:noFill/>
+          <a:ln>
+            <a:noFill/>
+          </a:ln>
         </p:spPr>
         <p:txBody>
           <a:bodyPr anchorCtr="0" anchor="t" bIns="45700" lIns="91425" spcFirstLastPara="1" rIns="91425" wrap="square" tIns="45700">
@@ -2738,12 +2878,16 @@
           <a:lstStyle/>
           <a:p>
             <a:pPr indent="0" lvl="0" marL="0" rtl="0" algn="l">
-              <a:spcBef>
-                <a:spcPts val="0"/>
-              </a:spcBef>
-              <a:spcAft>
-                <a:spcPts val="0"/>
-              </a:spcAft>
+              <a:lnSpc>
+                <a:spcPct val="100000"/>
+              </a:lnSpc>
+              <a:spcBef>
+                <a:spcPts val="0"/>
+              </a:spcBef>
+              <a:spcAft>
+                <a:spcPts val="0"/>
+              </a:spcAft>
+              <a:buSzPts val="1400"/>
               <a:buNone/>
             </a:pPr>
             <a:r>
@@ -2769,6 +2913,10 @@
           <a:prstGeom prst="rect">
             <a:avLst/>
           </a:prstGeom>
+          <a:noFill/>
+          <a:ln>
+            <a:noFill/>
+          </a:ln>
         </p:spPr>
         <p:txBody>
           <a:bodyPr anchorCtr="0" anchor="b" bIns="45700" lIns="91425" spcFirstLastPara="1" rIns="91425" wrap="square" tIns="45700">
@@ -2777,6 +2925,9 @@
           <a:lstStyle/>
           <a:p>
             <a:pPr indent="0" lvl="0" marL="0" rtl="0" algn="r">
+              <a:lnSpc>
+                <a:spcPct val="100000"/>
+              </a:lnSpc>
               <a:spcBef>
                 <a:spcPts val="0"/>
               </a:spcBef>
@@ -2856,6 +3007,16 @@
               </a:path>
             </a:pathLst>
           </a:custGeom>
+          <a:noFill/>
+          <a:ln cap="flat" cmpd="sng" w="12700">
+            <a:solidFill>
+              <a:srgbClr val="000000"/>
+            </a:solidFill>
+            <a:prstDash val="solid"/>
+            <a:round/>
+            <a:headEnd len="sm" w="sm" type="none"/>
+            <a:tailEnd len="sm" w="sm" type="none"/>
+          </a:ln>
         </p:spPr>
       </p:sp>
       <p:sp>
@@ -2874,6 +3035,10 @@
           <a:prstGeom prst="rect">
             <a:avLst/>
           </a:prstGeom>
+          <a:noFill/>
+          <a:ln>
+            <a:noFill/>
+          </a:ln>
         </p:spPr>
         <p:txBody>
           <a:bodyPr anchorCtr="0" anchor="t" bIns="45700" lIns="91425" spcFirstLastPara="1" rIns="91425" wrap="square" tIns="45700">
@@ -2882,12 +3047,16 @@
           <a:lstStyle/>
           <a:p>
             <a:pPr indent="0" lvl="0" marL="0" rtl="0" algn="l">
-              <a:spcBef>
-                <a:spcPts val="0"/>
-              </a:spcBef>
-              <a:spcAft>
-                <a:spcPts val="0"/>
-              </a:spcAft>
+              <a:lnSpc>
+                <a:spcPct val="100000"/>
+              </a:lnSpc>
+              <a:spcBef>
+                <a:spcPts val="0"/>
+              </a:spcBef>
+              <a:spcAft>
+                <a:spcPts val="0"/>
+              </a:spcAft>
+              <a:buSzPts val="1400"/>
               <a:buNone/>
             </a:pPr>
             <a:r>
@@ -2913,6 +3082,10 @@
           <a:prstGeom prst="rect">
             <a:avLst/>
           </a:prstGeom>
+          <a:noFill/>
+          <a:ln>
+            <a:noFill/>
+          </a:ln>
         </p:spPr>
         <p:txBody>
           <a:bodyPr anchorCtr="0" anchor="b" bIns="45700" lIns="91425" spcFirstLastPara="1" rIns="91425" wrap="square" tIns="45700">
@@ -2921,6 +3094,9 @@
           <a:lstStyle/>
           <a:p>
             <a:pPr indent="0" lvl="0" marL="0" rtl="0" algn="r">
+              <a:lnSpc>
+                <a:spcPct val="100000"/>
+              </a:lnSpc>
               <a:spcBef>
                 <a:spcPts val="0"/>
               </a:spcBef>
@@ -3000,6 +3176,16 @@
               </a:path>
             </a:pathLst>
           </a:custGeom>
+          <a:noFill/>
+          <a:ln cap="flat" cmpd="sng" w="12700">
+            <a:solidFill>
+              <a:srgbClr val="000000"/>
+            </a:solidFill>
+            <a:prstDash val="solid"/>
+            <a:round/>
+            <a:headEnd len="sm" w="sm" type="none"/>
+            <a:tailEnd len="sm" w="sm" type="none"/>
+          </a:ln>
         </p:spPr>
       </p:sp>
       <p:sp>
@@ -3018,6 +3204,10 @@
           <a:prstGeom prst="rect">
             <a:avLst/>
           </a:prstGeom>
+          <a:noFill/>
+          <a:ln>
+            <a:noFill/>
+          </a:ln>
         </p:spPr>
         <p:txBody>
           <a:bodyPr anchorCtr="0" anchor="t" bIns="45700" lIns="91425" spcFirstLastPara="1" rIns="91425" wrap="square" tIns="45700">
@@ -3026,12 +3216,16 @@
           <a:lstStyle/>
           <a:p>
             <a:pPr indent="0" lvl="0" marL="0" rtl="0" algn="l">
-              <a:spcBef>
-                <a:spcPts val="0"/>
-              </a:spcBef>
-              <a:spcAft>
-                <a:spcPts val="0"/>
-              </a:spcAft>
+              <a:lnSpc>
+                <a:spcPct val="100000"/>
+              </a:lnSpc>
+              <a:spcBef>
+                <a:spcPts val="0"/>
+              </a:spcBef>
+              <a:spcAft>
+                <a:spcPts val="0"/>
+              </a:spcAft>
+              <a:buSzPts val="1400"/>
               <a:buNone/>
             </a:pPr>
             <a:r>
@@ -3057,6 +3251,10 @@
           <a:prstGeom prst="rect">
             <a:avLst/>
           </a:prstGeom>
+          <a:noFill/>
+          <a:ln>
+            <a:noFill/>
+          </a:ln>
         </p:spPr>
         <p:txBody>
           <a:bodyPr anchorCtr="0" anchor="b" bIns="45700" lIns="91425" spcFirstLastPara="1" rIns="91425" wrap="square" tIns="45700">
@@ -3065,6 +3263,178 @@
           <a:lstStyle/>
           <a:p>
             <a:pPr indent="0" lvl="0" marL="0" rtl="0" algn="r">
+              <a:lnSpc>
+                <a:spcPct val="100000"/>
+              </a:lnSpc>
+              <a:spcBef>
+                <a:spcPts val="0"/>
+              </a:spcBef>
+              <a:spcAft>
+                <a:spcPts val="0"/>
+              </a:spcAft>
+              <a:buClr>
+                <a:srgbClr val="000000"/>
+              </a:buClr>
+              <a:buSzPts val="1200"/>
+              <a:buFont typeface="Arial"/>
+              <a:buNone/>
+            </a:pPr>
+            <a:fld id="{00000000-1234-1234-1234-123412341234}" type="slidenum">
+              <a:rPr lang="en-US"/>
+              <a:t>‹#›</a:t>
+            </a:fld>
+            <a:endParaRPr/>
+          </a:p>
+        </p:txBody>
+      </p:sp>
+    </p:spTree>
+  </p:cSld>
+  <p:clrMapOvr>
+    <a:masterClrMapping/>
+  </p:clrMapOvr>
+</p:notes>
+</file>
+
+<file path=ppt/notesSlides/notesSlide19.xml><?xml version="1.0" encoding="utf-8"?>
+<p:notes xmlns:a="http://schemas.openxmlformats.org/drawingml/2006/main" xmlns:r="http://schemas.openxmlformats.org/officeDocument/2006/relationships" xmlns:mc="http://schemas.openxmlformats.org/markup-compatibility/2006" xmlns:mv="urn:schemas-microsoft-com:mac:vml" xmlns:p="http://schemas.openxmlformats.org/presentationml/2006/main" xmlns:c="http://schemas.openxmlformats.org/drawingml/2006/chart" xmlns:dgm="http://schemas.openxmlformats.org/drawingml/2006/diagram" xmlns:o="urn:schemas-microsoft-com:office:office" xmlns:v="urn:schemas-microsoft-com:vml" xmlns:pvml="urn:schemas-microsoft-com:office:powerpoint" xmlns:com="http://schemas.openxmlformats.org/drawingml/2006/compatibility" xmlns:p14="http://schemas.microsoft.com/office/powerpoint/2010/main" xmlns:p15="http://schemas.microsoft.com/office/powerpoint/2012/main" xmlns:ahyp="http://schemas.microsoft.com/office/drawing/2018/hyperlinkcolor" showMasterPhAnim="0" showMasterSp="0">
+  <p:cSld>
+    <p:spTree>
+      <p:nvGrpSpPr>
+        <p:cNvPr id="200" name="Shape 200"/>
+        <p:cNvGrpSpPr/>
+        <p:nvPr/>
+      </p:nvGrpSpPr>
+      <p:grpSpPr>
+        <a:xfrm>
+          <a:off x="0" y="0"/>
+          <a:ext cx="0" cy="0"/>
+          <a:chOff x="0" y="0"/>
+          <a:chExt cx="0" cy="0"/>
+        </a:xfrm>
+      </p:grpSpPr>
+      <p:sp>
+        <p:nvSpPr>
+          <p:cNvPr id="201" name="Google Shape;201;g305414679b0_0_2:notes"/>
+          <p:cNvSpPr/>
+          <p:nvPr>
+            <p:ph idx="2" type="sldImg"/>
+          </p:nvPr>
+        </p:nvSpPr>
+        <p:spPr>
+          <a:xfrm>
+            <a:off x="1143000" y="685800"/>
+            <a:ext cx="4572000" cy="3429000"/>
+          </a:xfrm>
+          <a:custGeom>
+            <a:rect b="b" l="l" r="r" t="t"/>
+            <a:pathLst>
+              <a:path extrusionOk="0" h="120000" w="120000">
+                <a:moveTo>
+                  <a:pt x="0" y="0"/>
+                </a:moveTo>
+                <a:lnTo>
+                  <a:pt x="120000" y="0"/>
+                </a:lnTo>
+                <a:lnTo>
+                  <a:pt x="120000" y="120000"/>
+                </a:lnTo>
+                <a:lnTo>
+                  <a:pt x="0" y="120000"/>
+                </a:lnTo>
+                <a:close/>
+              </a:path>
+            </a:pathLst>
+          </a:custGeom>
+          <a:noFill/>
+          <a:ln cap="flat" cmpd="sng" w="12700">
+            <a:solidFill>
+              <a:srgbClr val="000000"/>
+            </a:solidFill>
+            <a:prstDash val="solid"/>
+            <a:round/>
+            <a:headEnd len="sm" w="sm" type="none"/>
+            <a:tailEnd len="sm" w="sm" type="none"/>
+          </a:ln>
+        </p:spPr>
+      </p:sp>
+      <p:sp>
+        <p:nvSpPr>
+          <p:cNvPr id="202" name="Google Shape;202;g305414679b0_0_2:notes"/>
+          <p:cNvSpPr txBox="1"/>
+          <p:nvPr>
+            <p:ph idx="1" type="body"/>
+          </p:nvPr>
+        </p:nvSpPr>
+        <p:spPr>
+          <a:xfrm>
+            <a:off x="685800" y="4343400"/>
+            <a:ext cx="5486400" cy="4114800"/>
+          </a:xfrm>
+          <a:prstGeom prst="rect">
+            <a:avLst/>
+          </a:prstGeom>
+          <a:noFill/>
+          <a:ln>
+            <a:noFill/>
+          </a:ln>
+        </p:spPr>
+        <p:txBody>
+          <a:bodyPr anchorCtr="0" anchor="t" bIns="45700" lIns="91425" spcFirstLastPara="1" rIns="91425" wrap="square" tIns="45700">
+            <a:noAutofit/>
+          </a:bodyPr>
+          <a:lstStyle/>
+          <a:p>
+            <a:pPr indent="0" lvl="0" marL="0" rtl="0" algn="l">
+              <a:lnSpc>
+                <a:spcPct val="100000"/>
+              </a:lnSpc>
+              <a:spcBef>
+                <a:spcPts val="0"/>
+              </a:spcBef>
+              <a:spcAft>
+                <a:spcPts val="0"/>
+              </a:spcAft>
+              <a:buSzPts val="1400"/>
+              <a:buNone/>
+            </a:pPr>
+            <a:r>
+              <a:t/>
+            </a:r>
+            <a:endParaRPr/>
+          </a:p>
+        </p:txBody>
+      </p:sp>
+      <p:sp>
+        <p:nvSpPr>
+          <p:cNvPr id="203" name="Google Shape;203;g305414679b0_0_2:notes"/>
+          <p:cNvSpPr txBox="1"/>
+          <p:nvPr>
+            <p:ph idx="12" type="sldNum"/>
+          </p:nvPr>
+        </p:nvSpPr>
+        <p:spPr>
+          <a:xfrm>
+            <a:off x="3884613" y="8685213"/>
+            <a:ext cx="2971800" cy="457200"/>
+          </a:xfrm>
+          <a:prstGeom prst="rect">
+            <a:avLst/>
+          </a:prstGeom>
+          <a:noFill/>
+          <a:ln>
+            <a:noFill/>
+          </a:ln>
+        </p:spPr>
+        <p:txBody>
+          <a:bodyPr anchorCtr="0" anchor="b" bIns="45700" lIns="91425" spcFirstLastPara="1" rIns="91425" wrap="square" tIns="45700">
+            <a:noAutofit/>
+          </a:bodyPr>
+          <a:lstStyle/>
+          <a:p>
+            <a:pPr indent="0" lvl="0" marL="0" rtl="0" algn="r">
+              <a:lnSpc>
+                <a:spcPct val="100000"/>
+              </a:lnSpc>
               <a:spcBef>
                 <a:spcPts val="0"/>
               </a:spcBef>
@@ -6941,8 +7311,8 @@
 </file>
 
 <file path=ppt/slideLayouts/slideLayout2.xml><?xml version="1.0" encoding="utf-8"?>
-<p:sldLayout xmlns:a="http://schemas.openxmlformats.org/drawingml/2006/main" xmlns:r="http://schemas.openxmlformats.org/officeDocument/2006/relationships" xmlns:mc="http://schemas.openxmlformats.org/markup-compatibility/2006" xmlns:mv="urn:schemas-microsoft-com:mac:vml" xmlns:p="http://schemas.openxmlformats.org/presentationml/2006/main" xmlns:c="http://schemas.openxmlformats.org/drawingml/2006/chart" xmlns:dgm="http://schemas.openxmlformats.org/drawingml/2006/diagram" xmlns:o="urn:schemas-microsoft-com:office:office" xmlns:v="urn:schemas-microsoft-com:vml" xmlns:pvml="urn:schemas-microsoft-com:office:powerpoint" xmlns:com="http://schemas.openxmlformats.org/drawingml/2006/compatibility" xmlns:p14="http://schemas.microsoft.com/office/powerpoint/2010/main" xmlns:p15="http://schemas.microsoft.com/office/powerpoint/2012/main" xmlns:ahyp="http://schemas.microsoft.com/office/drawing/2018/hyperlinkcolor" matchingName="Two Content" type="twoObj">
-  <p:cSld name="TWO_OBJECTS">
+<p:sldLayout xmlns:a="http://schemas.openxmlformats.org/drawingml/2006/main" xmlns:r="http://schemas.openxmlformats.org/officeDocument/2006/relationships" xmlns:mc="http://schemas.openxmlformats.org/markup-compatibility/2006" xmlns:mv="urn:schemas-microsoft-com:mac:vml" xmlns:p="http://schemas.openxmlformats.org/presentationml/2006/main" xmlns:c="http://schemas.openxmlformats.org/drawingml/2006/chart" xmlns:dgm="http://schemas.openxmlformats.org/drawingml/2006/diagram" xmlns:o="urn:schemas-microsoft-com:office:office" xmlns:v="urn:schemas-microsoft-com:vml" xmlns:pvml="urn:schemas-microsoft-com:office:powerpoint" xmlns:com="http://schemas.openxmlformats.org/drawingml/2006/compatibility" xmlns:p14="http://schemas.microsoft.com/office/powerpoint/2010/main" xmlns:p15="http://schemas.microsoft.com/office/powerpoint/2012/main" xmlns:ahyp="http://schemas.microsoft.com/office/drawing/2018/hyperlinkcolor" matchingName="Title and Content" type="obj">
+  <p:cSld name="OBJECT">
     <p:spTree>
       <p:nvGrpSpPr>
         <p:cNvPr id="21" name="Shape 21"/>
@@ -6959,7 +7329,7 @@
       </p:grpSpPr>
       <p:sp>
         <p:nvSpPr>
-          <p:cNvPr id="22" name="Google Shape;22;p42"/>
+          <p:cNvPr id="22" name="Google Shape;22;p43"/>
           <p:cNvSpPr txBox="1"/>
           <p:nvPr>
             <p:ph type="title"/>
@@ -7118,7 +7488,965 @@
       </p:sp>
       <p:sp>
         <p:nvSpPr>
-          <p:cNvPr id="23" name="Google Shape;23;p42"/>
+          <p:cNvPr id="23" name="Google Shape;23;p43"/>
+          <p:cNvSpPr txBox="1"/>
+          <p:nvPr>
+            <p:ph idx="1" type="body"/>
+          </p:nvPr>
+        </p:nvSpPr>
+        <p:spPr>
+          <a:xfrm>
+            <a:off x="457200" y="1600200"/>
+            <a:ext cx="8229600" cy="4525963"/>
+          </a:xfrm>
+          <a:prstGeom prst="rect">
+            <a:avLst/>
+          </a:prstGeom>
+          <a:noFill/>
+          <a:ln>
+            <a:noFill/>
+          </a:ln>
+        </p:spPr>
+        <p:txBody>
+          <a:bodyPr anchorCtr="0" anchor="t" bIns="45700" lIns="91425" spcFirstLastPara="1" rIns="91425" wrap="square" tIns="45700">
+            <a:normAutofit/>
+          </a:bodyPr>
+          <a:lstStyle>
+            <a:lvl1pPr indent="-342900" lvl="0" marL="457200" algn="l">
+              <a:lnSpc>
+                <a:spcPct val="100000"/>
+              </a:lnSpc>
+              <a:spcBef>
+                <a:spcPts val="360"/>
+              </a:spcBef>
+              <a:spcAft>
+                <a:spcPts val="0"/>
+              </a:spcAft>
+              <a:buClr>
+                <a:schemeClr val="dk1"/>
+              </a:buClr>
+              <a:buSzPts val="1800"/>
+              <a:buChar char="•"/>
+              <a:defRPr/>
+            </a:lvl1pPr>
+            <a:lvl2pPr indent="-342900" lvl="1" marL="914400" algn="l">
+              <a:lnSpc>
+                <a:spcPct val="100000"/>
+              </a:lnSpc>
+              <a:spcBef>
+                <a:spcPts val="360"/>
+              </a:spcBef>
+              <a:spcAft>
+                <a:spcPts val="0"/>
+              </a:spcAft>
+              <a:buClr>
+                <a:schemeClr val="dk1"/>
+              </a:buClr>
+              <a:buSzPts val="1800"/>
+              <a:buChar char="–"/>
+              <a:defRPr/>
+            </a:lvl2pPr>
+            <a:lvl3pPr indent="-342900" lvl="2" marL="1371600" algn="l">
+              <a:lnSpc>
+                <a:spcPct val="100000"/>
+              </a:lnSpc>
+              <a:spcBef>
+                <a:spcPts val="360"/>
+              </a:spcBef>
+              <a:spcAft>
+                <a:spcPts val="0"/>
+              </a:spcAft>
+              <a:buClr>
+                <a:schemeClr val="dk1"/>
+              </a:buClr>
+              <a:buSzPts val="1800"/>
+              <a:buChar char="•"/>
+              <a:defRPr/>
+            </a:lvl3pPr>
+            <a:lvl4pPr indent="-342900" lvl="3" marL="1828800" algn="l">
+              <a:lnSpc>
+                <a:spcPct val="100000"/>
+              </a:lnSpc>
+              <a:spcBef>
+                <a:spcPts val="360"/>
+              </a:spcBef>
+              <a:spcAft>
+                <a:spcPts val="0"/>
+              </a:spcAft>
+              <a:buClr>
+                <a:schemeClr val="dk1"/>
+              </a:buClr>
+              <a:buSzPts val="1800"/>
+              <a:buChar char="–"/>
+              <a:defRPr/>
+            </a:lvl4pPr>
+            <a:lvl5pPr indent="-342900" lvl="4" marL="2286000" algn="l">
+              <a:lnSpc>
+                <a:spcPct val="100000"/>
+              </a:lnSpc>
+              <a:spcBef>
+                <a:spcPts val="360"/>
+              </a:spcBef>
+              <a:spcAft>
+                <a:spcPts val="0"/>
+              </a:spcAft>
+              <a:buClr>
+                <a:schemeClr val="dk1"/>
+              </a:buClr>
+              <a:buSzPts val="1800"/>
+              <a:buChar char="»"/>
+              <a:defRPr/>
+            </a:lvl5pPr>
+            <a:lvl6pPr indent="-342900" lvl="5" marL="2743200" algn="l">
+              <a:lnSpc>
+                <a:spcPct val="100000"/>
+              </a:lnSpc>
+              <a:spcBef>
+                <a:spcPts val="360"/>
+              </a:spcBef>
+              <a:spcAft>
+                <a:spcPts val="0"/>
+              </a:spcAft>
+              <a:buClr>
+                <a:schemeClr val="dk1"/>
+              </a:buClr>
+              <a:buSzPts val="1800"/>
+              <a:buChar char="•"/>
+              <a:defRPr/>
+            </a:lvl6pPr>
+            <a:lvl7pPr indent="-342900" lvl="6" marL="3200400" algn="l">
+              <a:lnSpc>
+                <a:spcPct val="100000"/>
+              </a:lnSpc>
+              <a:spcBef>
+                <a:spcPts val="360"/>
+              </a:spcBef>
+              <a:spcAft>
+                <a:spcPts val="0"/>
+              </a:spcAft>
+              <a:buClr>
+                <a:schemeClr val="dk1"/>
+              </a:buClr>
+              <a:buSzPts val="1800"/>
+              <a:buChar char="•"/>
+              <a:defRPr/>
+            </a:lvl7pPr>
+            <a:lvl8pPr indent="-342900" lvl="7" marL="3657600" algn="l">
+              <a:lnSpc>
+                <a:spcPct val="100000"/>
+              </a:lnSpc>
+              <a:spcBef>
+                <a:spcPts val="360"/>
+              </a:spcBef>
+              <a:spcAft>
+                <a:spcPts val="0"/>
+              </a:spcAft>
+              <a:buClr>
+                <a:schemeClr val="dk1"/>
+              </a:buClr>
+              <a:buSzPts val="1800"/>
+              <a:buChar char="•"/>
+              <a:defRPr/>
+            </a:lvl8pPr>
+            <a:lvl9pPr indent="-342900" lvl="8" marL="4114800" algn="l">
+              <a:lnSpc>
+                <a:spcPct val="100000"/>
+              </a:lnSpc>
+              <a:spcBef>
+                <a:spcPts val="360"/>
+              </a:spcBef>
+              <a:spcAft>
+                <a:spcPts val="0"/>
+              </a:spcAft>
+              <a:buClr>
+                <a:schemeClr val="dk1"/>
+              </a:buClr>
+              <a:buSzPts val="1800"/>
+              <a:buChar char="•"/>
+              <a:defRPr/>
+            </a:lvl9pPr>
+          </a:lstStyle>
+          <a:p/>
+        </p:txBody>
+      </p:sp>
+      <p:sp>
+        <p:nvSpPr>
+          <p:cNvPr id="24" name="Google Shape;24;p43"/>
+          <p:cNvSpPr txBox="1"/>
+          <p:nvPr>
+            <p:ph idx="10" type="dt"/>
+          </p:nvPr>
+        </p:nvSpPr>
+        <p:spPr>
+          <a:xfrm>
+            <a:off x="457200" y="6356350"/>
+            <a:ext cx="2133600" cy="365125"/>
+          </a:xfrm>
+          <a:prstGeom prst="rect">
+            <a:avLst/>
+          </a:prstGeom>
+          <a:noFill/>
+          <a:ln>
+            <a:noFill/>
+          </a:ln>
+        </p:spPr>
+        <p:txBody>
+          <a:bodyPr anchorCtr="0" anchor="ctr" bIns="45700" lIns="91425" spcFirstLastPara="1" rIns="91425" wrap="square" tIns="45700">
+            <a:noAutofit/>
+          </a:bodyPr>
+          <a:lstStyle>
+            <a:lvl1pPr lvl="0" algn="l">
+              <a:lnSpc>
+                <a:spcPct val="100000"/>
+              </a:lnSpc>
+              <a:spcBef>
+                <a:spcPts val="0"/>
+              </a:spcBef>
+              <a:spcAft>
+                <a:spcPts val="0"/>
+              </a:spcAft>
+              <a:buSzPts val="1400"/>
+              <a:buNone/>
+              <a:defRPr/>
+            </a:lvl1pPr>
+            <a:lvl2pPr lvl="1" algn="l">
+              <a:lnSpc>
+                <a:spcPct val="100000"/>
+              </a:lnSpc>
+              <a:spcBef>
+                <a:spcPts val="0"/>
+              </a:spcBef>
+              <a:spcAft>
+                <a:spcPts val="0"/>
+              </a:spcAft>
+              <a:buSzPts val="1400"/>
+              <a:buNone/>
+              <a:defRPr/>
+            </a:lvl2pPr>
+            <a:lvl3pPr lvl="2" algn="l">
+              <a:lnSpc>
+                <a:spcPct val="100000"/>
+              </a:lnSpc>
+              <a:spcBef>
+                <a:spcPts val="0"/>
+              </a:spcBef>
+              <a:spcAft>
+                <a:spcPts val="0"/>
+              </a:spcAft>
+              <a:buSzPts val="1400"/>
+              <a:buNone/>
+              <a:defRPr/>
+            </a:lvl3pPr>
+            <a:lvl4pPr lvl="3" algn="l">
+              <a:lnSpc>
+                <a:spcPct val="100000"/>
+              </a:lnSpc>
+              <a:spcBef>
+                <a:spcPts val="0"/>
+              </a:spcBef>
+              <a:spcAft>
+                <a:spcPts val="0"/>
+              </a:spcAft>
+              <a:buSzPts val="1400"/>
+              <a:buNone/>
+              <a:defRPr/>
+            </a:lvl4pPr>
+            <a:lvl5pPr lvl="4" algn="l">
+              <a:lnSpc>
+                <a:spcPct val="100000"/>
+              </a:lnSpc>
+              <a:spcBef>
+                <a:spcPts val="0"/>
+              </a:spcBef>
+              <a:spcAft>
+                <a:spcPts val="0"/>
+              </a:spcAft>
+              <a:buSzPts val="1400"/>
+              <a:buNone/>
+              <a:defRPr/>
+            </a:lvl5pPr>
+            <a:lvl6pPr lvl="5" algn="l">
+              <a:lnSpc>
+                <a:spcPct val="100000"/>
+              </a:lnSpc>
+              <a:spcBef>
+                <a:spcPts val="0"/>
+              </a:spcBef>
+              <a:spcAft>
+                <a:spcPts val="0"/>
+              </a:spcAft>
+              <a:buSzPts val="1400"/>
+              <a:buNone/>
+              <a:defRPr/>
+            </a:lvl6pPr>
+            <a:lvl7pPr lvl="6" algn="l">
+              <a:lnSpc>
+                <a:spcPct val="100000"/>
+              </a:lnSpc>
+              <a:spcBef>
+                <a:spcPts val="0"/>
+              </a:spcBef>
+              <a:spcAft>
+                <a:spcPts val="0"/>
+              </a:spcAft>
+              <a:buSzPts val="1400"/>
+              <a:buNone/>
+              <a:defRPr/>
+            </a:lvl7pPr>
+            <a:lvl8pPr lvl="7" algn="l">
+              <a:lnSpc>
+                <a:spcPct val="100000"/>
+              </a:lnSpc>
+              <a:spcBef>
+                <a:spcPts val="0"/>
+              </a:spcBef>
+              <a:spcAft>
+                <a:spcPts val="0"/>
+              </a:spcAft>
+              <a:buSzPts val="1400"/>
+              <a:buNone/>
+              <a:defRPr/>
+            </a:lvl8pPr>
+            <a:lvl9pPr lvl="8" algn="l">
+              <a:lnSpc>
+                <a:spcPct val="100000"/>
+              </a:lnSpc>
+              <a:spcBef>
+                <a:spcPts val="0"/>
+              </a:spcBef>
+              <a:spcAft>
+                <a:spcPts val="0"/>
+              </a:spcAft>
+              <a:buSzPts val="1400"/>
+              <a:buNone/>
+              <a:defRPr/>
+            </a:lvl9pPr>
+          </a:lstStyle>
+          <a:p/>
+        </p:txBody>
+      </p:sp>
+      <p:sp>
+        <p:nvSpPr>
+          <p:cNvPr id="25" name="Google Shape;25;p43"/>
+          <p:cNvSpPr txBox="1"/>
+          <p:nvPr>
+            <p:ph idx="11" type="ftr"/>
+          </p:nvPr>
+        </p:nvSpPr>
+        <p:spPr>
+          <a:xfrm>
+            <a:off x="3124200" y="6356350"/>
+            <a:ext cx="2895600" cy="365125"/>
+          </a:xfrm>
+          <a:prstGeom prst="rect">
+            <a:avLst/>
+          </a:prstGeom>
+          <a:noFill/>
+          <a:ln>
+            <a:noFill/>
+          </a:ln>
+        </p:spPr>
+        <p:txBody>
+          <a:bodyPr anchorCtr="0" anchor="ctr" bIns="45700" lIns="91425" spcFirstLastPara="1" rIns="91425" wrap="square" tIns="45700">
+            <a:noAutofit/>
+          </a:bodyPr>
+          <a:lstStyle>
+            <a:lvl1pPr lvl="0" algn="ctr">
+              <a:lnSpc>
+                <a:spcPct val="100000"/>
+              </a:lnSpc>
+              <a:spcBef>
+                <a:spcPts val="0"/>
+              </a:spcBef>
+              <a:spcAft>
+                <a:spcPts val="0"/>
+              </a:spcAft>
+              <a:buSzPts val="1400"/>
+              <a:buNone/>
+              <a:defRPr/>
+            </a:lvl1pPr>
+            <a:lvl2pPr lvl="1" algn="l">
+              <a:lnSpc>
+                <a:spcPct val="100000"/>
+              </a:lnSpc>
+              <a:spcBef>
+                <a:spcPts val="0"/>
+              </a:spcBef>
+              <a:spcAft>
+                <a:spcPts val="0"/>
+              </a:spcAft>
+              <a:buSzPts val="1400"/>
+              <a:buNone/>
+              <a:defRPr/>
+            </a:lvl2pPr>
+            <a:lvl3pPr lvl="2" algn="l">
+              <a:lnSpc>
+                <a:spcPct val="100000"/>
+              </a:lnSpc>
+              <a:spcBef>
+                <a:spcPts val="0"/>
+              </a:spcBef>
+              <a:spcAft>
+                <a:spcPts val="0"/>
+              </a:spcAft>
+              <a:buSzPts val="1400"/>
+              <a:buNone/>
+              <a:defRPr/>
+            </a:lvl3pPr>
+            <a:lvl4pPr lvl="3" algn="l">
+              <a:lnSpc>
+                <a:spcPct val="100000"/>
+              </a:lnSpc>
+              <a:spcBef>
+                <a:spcPts val="0"/>
+              </a:spcBef>
+              <a:spcAft>
+                <a:spcPts val="0"/>
+              </a:spcAft>
+              <a:buSzPts val="1400"/>
+              <a:buNone/>
+              <a:defRPr/>
+            </a:lvl4pPr>
+            <a:lvl5pPr lvl="4" algn="l">
+              <a:lnSpc>
+                <a:spcPct val="100000"/>
+              </a:lnSpc>
+              <a:spcBef>
+                <a:spcPts val="0"/>
+              </a:spcBef>
+              <a:spcAft>
+                <a:spcPts val="0"/>
+              </a:spcAft>
+              <a:buSzPts val="1400"/>
+              <a:buNone/>
+              <a:defRPr/>
+            </a:lvl5pPr>
+            <a:lvl6pPr lvl="5" algn="l">
+              <a:lnSpc>
+                <a:spcPct val="100000"/>
+              </a:lnSpc>
+              <a:spcBef>
+                <a:spcPts val="0"/>
+              </a:spcBef>
+              <a:spcAft>
+                <a:spcPts val="0"/>
+              </a:spcAft>
+              <a:buSzPts val="1400"/>
+              <a:buNone/>
+              <a:defRPr/>
+            </a:lvl6pPr>
+            <a:lvl7pPr lvl="6" algn="l">
+              <a:lnSpc>
+                <a:spcPct val="100000"/>
+              </a:lnSpc>
+              <a:spcBef>
+                <a:spcPts val="0"/>
+              </a:spcBef>
+              <a:spcAft>
+                <a:spcPts val="0"/>
+              </a:spcAft>
+              <a:buSzPts val="1400"/>
+              <a:buNone/>
+              <a:defRPr/>
+            </a:lvl7pPr>
+            <a:lvl8pPr lvl="7" algn="l">
+              <a:lnSpc>
+                <a:spcPct val="100000"/>
+              </a:lnSpc>
+              <a:spcBef>
+                <a:spcPts val="0"/>
+              </a:spcBef>
+              <a:spcAft>
+                <a:spcPts val="0"/>
+              </a:spcAft>
+              <a:buSzPts val="1400"/>
+              <a:buNone/>
+              <a:defRPr/>
+            </a:lvl8pPr>
+            <a:lvl9pPr lvl="8" algn="l">
+              <a:lnSpc>
+                <a:spcPct val="100000"/>
+              </a:lnSpc>
+              <a:spcBef>
+                <a:spcPts val="0"/>
+              </a:spcBef>
+              <a:spcAft>
+                <a:spcPts val="0"/>
+              </a:spcAft>
+              <a:buSzPts val="1400"/>
+              <a:buNone/>
+              <a:defRPr/>
+            </a:lvl9pPr>
+          </a:lstStyle>
+          <a:p/>
+        </p:txBody>
+      </p:sp>
+      <p:sp>
+        <p:nvSpPr>
+          <p:cNvPr id="26" name="Google Shape;26;p43"/>
+          <p:cNvSpPr txBox="1"/>
+          <p:nvPr>
+            <p:ph idx="12" type="sldNum"/>
+          </p:nvPr>
+        </p:nvSpPr>
+        <p:spPr>
+          <a:xfrm>
+            <a:off x="6553200" y="6356350"/>
+            <a:ext cx="2133600" cy="365125"/>
+          </a:xfrm>
+          <a:prstGeom prst="rect">
+            <a:avLst/>
+          </a:prstGeom>
+          <a:noFill/>
+          <a:ln>
+            <a:noFill/>
+          </a:ln>
+        </p:spPr>
+        <p:txBody>
+          <a:bodyPr anchorCtr="0" anchor="ctr" bIns="45700" lIns="91425" spcFirstLastPara="1" rIns="91425" wrap="square" tIns="45700">
+            <a:noAutofit/>
+          </a:bodyPr>
+          <a:lstStyle>
+            <a:lvl1pPr indent="0" lvl="0" marL="0" marR="0" algn="r">
+              <a:lnSpc>
+                <a:spcPct val="100000"/>
+              </a:lnSpc>
+              <a:spcBef>
+                <a:spcPts val="0"/>
+              </a:spcBef>
+              <a:spcAft>
+                <a:spcPts val="0"/>
+              </a:spcAft>
+              <a:buClr>
+                <a:srgbClr val="000000"/>
+              </a:buClr>
+              <a:buSzPts val="1200"/>
+              <a:buFont typeface="Arial"/>
+              <a:buNone/>
+              <a:defRPr b="0" i="0" sz="1200" u="none" cap="none" strike="noStrike">
+                <a:solidFill>
+                  <a:srgbClr val="888888"/>
+                </a:solidFill>
+                <a:latin typeface="Calibri"/>
+                <a:ea typeface="Calibri"/>
+                <a:cs typeface="Calibri"/>
+                <a:sym typeface="Calibri"/>
+              </a:defRPr>
+            </a:lvl1pPr>
+            <a:lvl2pPr indent="0" lvl="1" marL="0" marR="0" algn="r">
+              <a:lnSpc>
+                <a:spcPct val="100000"/>
+              </a:lnSpc>
+              <a:spcBef>
+                <a:spcPts val="0"/>
+              </a:spcBef>
+              <a:spcAft>
+                <a:spcPts val="0"/>
+              </a:spcAft>
+              <a:buClr>
+                <a:srgbClr val="000000"/>
+              </a:buClr>
+              <a:buSzPts val="1200"/>
+              <a:buFont typeface="Arial"/>
+              <a:buNone/>
+              <a:defRPr b="0" i="0" sz="1200" u="none" cap="none" strike="noStrike">
+                <a:solidFill>
+                  <a:srgbClr val="888888"/>
+                </a:solidFill>
+                <a:latin typeface="Calibri"/>
+                <a:ea typeface="Calibri"/>
+                <a:cs typeface="Calibri"/>
+                <a:sym typeface="Calibri"/>
+              </a:defRPr>
+            </a:lvl2pPr>
+            <a:lvl3pPr indent="0" lvl="2" marL="0" marR="0" algn="r">
+              <a:lnSpc>
+                <a:spcPct val="100000"/>
+              </a:lnSpc>
+              <a:spcBef>
+                <a:spcPts val="0"/>
+              </a:spcBef>
+              <a:spcAft>
+                <a:spcPts val="0"/>
+              </a:spcAft>
+              <a:buClr>
+                <a:srgbClr val="000000"/>
+              </a:buClr>
+              <a:buSzPts val="1200"/>
+              <a:buFont typeface="Arial"/>
+              <a:buNone/>
+              <a:defRPr b="0" i="0" sz="1200" u="none" cap="none" strike="noStrike">
+                <a:solidFill>
+                  <a:srgbClr val="888888"/>
+                </a:solidFill>
+                <a:latin typeface="Calibri"/>
+                <a:ea typeface="Calibri"/>
+                <a:cs typeface="Calibri"/>
+                <a:sym typeface="Calibri"/>
+              </a:defRPr>
+            </a:lvl3pPr>
+            <a:lvl4pPr indent="0" lvl="3" marL="0" marR="0" algn="r">
+              <a:lnSpc>
+                <a:spcPct val="100000"/>
+              </a:lnSpc>
+              <a:spcBef>
+                <a:spcPts val="0"/>
+              </a:spcBef>
+              <a:spcAft>
+                <a:spcPts val="0"/>
+              </a:spcAft>
+              <a:buClr>
+                <a:srgbClr val="000000"/>
+              </a:buClr>
+              <a:buSzPts val="1200"/>
+              <a:buFont typeface="Arial"/>
+              <a:buNone/>
+              <a:defRPr b="0" i="0" sz="1200" u="none" cap="none" strike="noStrike">
+                <a:solidFill>
+                  <a:srgbClr val="888888"/>
+                </a:solidFill>
+                <a:latin typeface="Calibri"/>
+                <a:ea typeface="Calibri"/>
+                <a:cs typeface="Calibri"/>
+                <a:sym typeface="Calibri"/>
+              </a:defRPr>
+            </a:lvl4pPr>
+            <a:lvl5pPr indent="0" lvl="4" marL="0" marR="0" algn="r">
+              <a:lnSpc>
+                <a:spcPct val="100000"/>
+              </a:lnSpc>
+              <a:spcBef>
+                <a:spcPts val="0"/>
+              </a:spcBef>
+              <a:spcAft>
+                <a:spcPts val="0"/>
+              </a:spcAft>
+              <a:buClr>
+                <a:srgbClr val="000000"/>
+              </a:buClr>
+              <a:buSzPts val="1200"/>
+              <a:buFont typeface="Arial"/>
+              <a:buNone/>
+              <a:defRPr b="0" i="0" sz="1200" u="none" cap="none" strike="noStrike">
+                <a:solidFill>
+                  <a:srgbClr val="888888"/>
+                </a:solidFill>
+                <a:latin typeface="Calibri"/>
+                <a:ea typeface="Calibri"/>
+                <a:cs typeface="Calibri"/>
+                <a:sym typeface="Calibri"/>
+              </a:defRPr>
+            </a:lvl5pPr>
+            <a:lvl6pPr indent="0" lvl="5" marL="0" marR="0" algn="r">
+              <a:lnSpc>
+                <a:spcPct val="100000"/>
+              </a:lnSpc>
+              <a:spcBef>
+                <a:spcPts val="0"/>
+              </a:spcBef>
+              <a:spcAft>
+                <a:spcPts val="0"/>
+              </a:spcAft>
+              <a:buClr>
+                <a:srgbClr val="000000"/>
+              </a:buClr>
+              <a:buSzPts val="1200"/>
+              <a:buFont typeface="Arial"/>
+              <a:buNone/>
+              <a:defRPr b="0" i="0" sz="1200" u="none" cap="none" strike="noStrike">
+                <a:solidFill>
+                  <a:srgbClr val="888888"/>
+                </a:solidFill>
+                <a:latin typeface="Calibri"/>
+                <a:ea typeface="Calibri"/>
+                <a:cs typeface="Calibri"/>
+                <a:sym typeface="Calibri"/>
+              </a:defRPr>
+            </a:lvl6pPr>
+            <a:lvl7pPr indent="0" lvl="6" marL="0" marR="0" algn="r">
+              <a:lnSpc>
+                <a:spcPct val="100000"/>
+              </a:lnSpc>
+              <a:spcBef>
+                <a:spcPts val="0"/>
+              </a:spcBef>
+              <a:spcAft>
+                <a:spcPts val="0"/>
+              </a:spcAft>
+              <a:buClr>
+                <a:srgbClr val="000000"/>
+              </a:buClr>
+              <a:buSzPts val="1200"/>
+              <a:buFont typeface="Arial"/>
+              <a:buNone/>
+              <a:defRPr b="0" i="0" sz="1200" u="none" cap="none" strike="noStrike">
+                <a:solidFill>
+                  <a:srgbClr val="888888"/>
+                </a:solidFill>
+                <a:latin typeface="Calibri"/>
+                <a:ea typeface="Calibri"/>
+                <a:cs typeface="Calibri"/>
+                <a:sym typeface="Calibri"/>
+              </a:defRPr>
+            </a:lvl7pPr>
+            <a:lvl8pPr indent="0" lvl="7" marL="0" marR="0" algn="r">
+              <a:lnSpc>
+                <a:spcPct val="100000"/>
+              </a:lnSpc>
+              <a:spcBef>
+                <a:spcPts val="0"/>
+              </a:spcBef>
+              <a:spcAft>
+                <a:spcPts val="0"/>
+              </a:spcAft>
+              <a:buClr>
+                <a:srgbClr val="000000"/>
+              </a:buClr>
+              <a:buSzPts val="1200"/>
+              <a:buFont typeface="Arial"/>
+              <a:buNone/>
+              <a:defRPr b="0" i="0" sz="1200" u="none" cap="none" strike="noStrike">
+                <a:solidFill>
+                  <a:srgbClr val="888888"/>
+                </a:solidFill>
+                <a:latin typeface="Calibri"/>
+                <a:ea typeface="Calibri"/>
+                <a:cs typeface="Calibri"/>
+                <a:sym typeface="Calibri"/>
+              </a:defRPr>
+            </a:lvl8pPr>
+            <a:lvl9pPr indent="0" lvl="8" marL="0" marR="0" algn="r">
+              <a:lnSpc>
+                <a:spcPct val="100000"/>
+              </a:lnSpc>
+              <a:spcBef>
+                <a:spcPts val="0"/>
+              </a:spcBef>
+              <a:spcAft>
+                <a:spcPts val="0"/>
+              </a:spcAft>
+              <a:buClr>
+                <a:srgbClr val="000000"/>
+              </a:buClr>
+              <a:buSzPts val="1200"/>
+              <a:buFont typeface="Arial"/>
+              <a:buNone/>
+              <a:defRPr b="0" i="0" sz="1200" u="none" cap="none" strike="noStrike">
+                <a:solidFill>
+                  <a:srgbClr val="888888"/>
+                </a:solidFill>
+                <a:latin typeface="Calibri"/>
+                <a:ea typeface="Calibri"/>
+                <a:cs typeface="Calibri"/>
+                <a:sym typeface="Calibri"/>
+              </a:defRPr>
+            </a:lvl9pPr>
+          </a:lstStyle>
+          <a:p>
+            <a:pPr indent="0" lvl="0" marL="0" rtl="0" algn="r">
+              <a:spcBef>
+                <a:spcPts val="0"/>
+              </a:spcBef>
+              <a:spcAft>
+                <a:spcPts val="0"/>
+              </a:spcAft>
+              <a:buNone/>
+            </a:pPr>
+            <a:fld id="{00000000-1234-1234-1234-123412341234}" type="slidenum">
+              <a:rPr lang="en-US"/>
+              <a:t>‹#›</a:t>
+            </a:fld>
+            <a:endParaRPr/>
+          </a:p>
+        </p:txBody>
+      </p:sp>
+    </p:spTree>
+  </p:cSld>
+  <p:clrMapOvr>
+    <a:masterClrMapping/>
+  </p:clrMapOvr>
+</p:sldLayout>
+</file>
+
+<file path=ppt/slideLayouts/slideLayout3.xml><?xml version="1.0" encoding="utf-8"?>
+<p:sldLayout xmlns:a="http://schemas.openxmlformats.org/drawingml/2006/main" xmlns:r="http://schemas.openxmlformats.org/officeDocument/2006/relationships" xmlns:mc="http://schemas.openxmlformats.org/markup-compatibility/2006" xmlns:mv="urn:schemas-microsoft-com:mac:vml" xmlns:p="http://schemas.openxmlformats.org/presentationml/2006/main" xmlns:c="http://schemas.openxmlformats.org/drawingml/2006/chart" xmlns:dgm="http://schemas.openxmlformats.org/drawingml/2006/diagram" xmlns:o="urn:schemas-microsoft-com:office:office" xmlns:v="urn:schemas-microsoft-com:vml" xmlns:pvml="urn:schemas-microsoft-com:office:powerpoint" xmlns:com="http://schemas.openxmlformats.org/drawingml/2006/compatibility" xmlns:p14="http://schemas.microsoft.com/office/powerpoint/2010/main" xmlns:p15="http://schemas.microsoft.com/office/powerpoint/2012/main" xmlns:ahyp="http://schemas.microsoft.com/office/drawing/2018/hyperlinkcolor" matchingName="Two Content" type="twoObj">
+  <p:cSld name="TWO_OBJECTS">
+    <p:spTree>
+      <p:nvGrpSpPr>
+        <p:cNvPr id="27" name="Shape 27"/>
+        <p:cNvGrpSpPr/>
+        <p:nvPr/>
+      </p:nvGrpSpPr>
+      <p:grpSpPr>
+        <a:xfrm>
+          <a:off x="0" y="0"/>
+          <a:ext cx="0" cy="0"/>
+          <a:chOff x="0" y="0"/>
+          <a:chExt cx="0" cy="0"/>
+        </a:xfrm>
+      </p:grpSpPr>
+      <p:sp>
+        <p:nvSpPr>
+          <p:cNvPr id="28" name="Google Shape;28;p42"/>
+          <p:cNvSpPr txBox="1"/>
+          <p:nvPr>
+            <p:ph type="title"/>
+          </p:nvPr>
+        </p:nvSpPr>
+        <p:spPr>
+          <a:xfrm>
+            <a:off x="457200" y="274638"/>
+            <a:ext cx="8229600" cy="1143000"/>
+          </a:xfrm>
+          <a:prstGeom prst="rect">
+            <a:avLst/>
+          </a:prstGeom>
+          <a:noFill/>
+          <a:ln>
+            <a:noFill/>
+          </a:ln>
+        </p:spPr>
+        <p:txBody>
+          <a:bodyPr anchorCtr="0" anchor="ctr" bIns="45700" lIns="91425" spcFirstLastPara="1" rIns="91425" wrap="square" tIns="45700">
+            <a:normAutofit/>
+          </a:bodyPr>
+          <a:lstStyle>
+            <a:lvl1pPr lvl="0" algn="ctr">
+              <a:lnSpc>
+                <a:spcPct val="100000"/>
+              </a:lnSpc>
+              <a:spcBef>
+                <a:spcPts val="0"/>
+              </a:spcBef>
+              <a:spcAft>
+                <a:spcPts val="0"/>
+              </a:spcAft>
+              <a:buClr>
+                <a:schemeClr val="dk1"/>
+              </a:buClr>
+              <a:buSzPts val="1800"/>
+              <a:buNone/>
+              <a:defRPr/>
+            </a:lvl1pPr>
+            <a:lvl2pPr lvl="1" algn="l">
+              <a:lnSpc>
+                <a:spcPct val="100000"/>
+              </a:lnSpc>
+              <a:spcBef>
+                <a:spcPts val="0"/>
+              </a:spcBef>
+              <a:spcAft>
+                <a:spcPts val="0"/>
+              </a:spcAft>
+              <a:buSzPts val="1400"/>
+              <a:buNone/>
+              <a:defRPr/>
+            </a:lvl2pPr>
+            <a:lvl3pPr lvl="2" algn="l">
+              <a:lnSpc>
+                <a:spcPct val="100000"/>
+              </a:lnSpc>
+              <a:spcBef>
+                <a:spcPts val="0"/>
+              </a:spcBef>
+              <a:spcAft>
+                <a:spcPts val="0"/>
+              </a:spcAft>
+              <a:buSzPts val="1400"/>
+              <a:buNone/>
+              <a:defRPr/>
+            </a:lvl3pPr>
+            <a:lvl4pPr lvl="3" algn="l">
+              <a:lnSpc>
+                <a:spcPct val="100000"/>
+              </a:lnSpc>
+              <a:spcBef>
+                <a:spcPts val="0"/>
+              </a:spcBef>
+              <a:spcAft>
+                <a:spcPts val="0"/>
+              </a:spcAft>
+              <a:buSzPts val="1400"/>
+              <a:buNone/>
+              <a:defRPr/>
+            </a:lvl4pPr>
+            <a:lvl5pPr lvl="4" algn="l">
+              <a:lnSpc>
+                <a:spcPct val="100000"/>
+              </a:lnSpc>
+              <a:spcBef>
+                <a:spcPts val="0"/>
+              </a:spcBef>
+              <a:spcAft>
+                <a:spcPts val="0"/>
+              </a:spcAft>
+              <a:buSzPts val="1400"/>
+              <a:buNone/>
+              <a:defRPr/>
+            </a:lvl5pPr>
+            <a:lvl6pPr lvl="5" algn="l">
+              <a:lnSpc>
+                <a:spcPct val="100000"/>
+              </a:lnSpc>
+              <a:spcBef>
+                <a:spcPts val="0"/>
+              </a:spcBef>
+              <a:spcAft>
+                <a:spcPts val="0"/>
+              </a:spcAft>
+              <a:buSzPts val="1400"/>
+              <a:buNone/>
+              <a:defRPr/>
+            </a:lvl6pPr>
+            <a:lvl7pPr lvl="6" algn="l">
+              <a:lnSpc>
+                <a:spcPct val="100000"/>
+              </a:lnSpc>
+              <a:spcBef>
+                <a:spcPts val="0"/>
+              </a:spcBef>
+              <a:spcAft>
+                <a:spcPts val="0"/>
+              </a:spcAft>
+              <a:buSzPts val="1400"/>
+              <a:buNone/>
+              <a:defRPr/>
+            </a:lvl7pPr>
+            <a:lvl8pPr lvl="7" algn="l">
+              <a:lnSpc>
+                <a:spcPct val="100000"/>
+              </a:lnSpc>
+              <a:spcBef>
+                <a:spcPts val="0"/>
+              </a:spcBef>
+              <a:spcAft>
+                <a:spcPts val="0"/>
+              </a:spcAft>
+              <a:buSzPts val="1400"/>
+              <a:buNone/>
+              <a:defRPr/>
+            </a:lvl8pPr>
+            <a:lvl9pPr lvl="8" algn="l">
+              <a:lnSpc>
+                <a:spcPct val="100000"/>
+              </a:lnSpc>
+              <a:spcBef>
+                <a:spcPts val="0"/>
+              </a:spcBef>
+              <a:spcAft>
+                <a:spcPts val="0"/>
+              </a:spcAft>
+              <a:buSzPts val="1400"/>
+              <a:buNone/>
+              <a:defRPr/>
+            </a:lvl9pPr>
+          </a:lstStyle>
+          <a:p/>
+        </p:txBody>
+      </p:sp>
+      <p:sp>
+        <p:nvSpPr>
+          <p:cNvPr id="29" name="Google Shape;29;p42"/>
           <p:cNvSpPr txBox="1"/>
           <p:nvPr>
             <p:ph idx="1" type="body"/>
@@ -7301,7 +8629,7 @@
       </p:sp>
       <p:sp>
         <p:nvSpPr>
-          <p:cNvPr id="24" name="Google Shape;24;p42"/>
+          <p:cNvPr id="30" name="Google Shape;30;p42"/>
           <p:cNvSpPr txBox="1"/>
           <p:nvPr>
             <p:ph idx="2" type="body"/>
@@ -7484,7 +8812,7 @@
       </p:sp>
       <p:sp>
         <p:nvSpPr>
-          <p:cNvPr id="25" name="Google Shape;25;p42"/>
+          <p:cNvPr id="31" name="Google Shape;31;p42"/>
           <p:cNvSpPr txBox="1"/>
           <p:nvPr>
             <p:ph idx="10" type="dt"/>
@@ -7640,7 +8968,7 @@
       </p:sp>
       <p:sp>
         <p:nvSpPr>
-          <p:cNvPr id="26" name="Google Shape;26;p42"/>
+          <p:cNvPr id="32" name="Google Shape;32;p42"/>
           <p:cNvSpPr txBox="1"/>
           <p:nvPr>
             <p:ph idx="11" type="ftr"/>
@@ -7796,965 +9124,7 @@
       </p:sp>
       <p:sp>
         <p:nvSpPr>
-          <p:cNvPr id="27" name="Google Shape;27;p42"/>
-          <p:cNvSpPr txBox="1"/>
-          <p:nvPr>
-            <p:ph idx="12" type="sldNum"/>
-          </p:nvPr>
-        </p:nvSpPr>
-        <p:spPr>
-          <a:xfrm>
-            <a:off x="6553200" y="6356350"/>
-            <a:ext cx="2133600" cy="365125"/>
-          </a:xfrm>
-          <a:prstGeom prst="rect">
-            <a:avLst/>
-          </a:prstGeom>
-          <a:noFill/>
-          <a:ln>
-            <a:noFill/>
-          </a:ln>
-        </p:spPr>
-        <p:txBody>
-          <a:bodyPr anchorCtr="0" anchor="ctr" bIns="45700" lIns="91425" spcFirstLastPara="1" rIns="91425" wrap="square" tIns="45700">
-            <a:noAutofit/>
-          </a:bodyPr>
-          <a:lstStyle>
-            <a:lvl1pPr indent="0" lvl="0" marL="0" marR="0" algn="r">
-              <a:lnSpc>
-                <a:spcPct val="100000"/>
-              </a:lnSpc>
-              <a:spcBef>
-                <a:spcPts val="0"/>
-              </a:spcBef>
-              <a:spcAft>
-                <a:spcPts val="0"/>
-              </a:spcAft>
-              <a:buClr>
-                <a:srgbClr val="000000"/>
-              </a:buClr>
-              <a:buSzPts val="1200"/>
-              <a:buFont typeface="Arial"/>
-              <a:buNone/>
-              <a:defRPr b="0" i="0" sz="1200" u="none" cap="none" strike="noStrike">
-                <a:solidFill>
-                  <a:srgbClr val="888888"/>
-                </a:solidFill>
-                <a:latin typeface="Calibri"/>
-                <a:ea typeface="Calibri"/>
-                <a:cs typeface="Calibri"/>
-                <a:sym typeface="Calibri"/>
-              </a:defRPr>
-            </a:lvl1pPr>
-            <a:lvl2pPr indent="0" lvl="1" marL="0" marR="0" algn="r">
-              <a:lnSpc>
-                <a:spcPct val="100000"/>
-              </a:lnSpc>
-              <a:spcBef>
-                <a:spcPts val="0"/>
-              </a:spcBef>
-              <a:spcAft>
-                <a:spcPts val="0"/>
-              </a:spcAft>
-              <a:buClr>
-                <a:srgbClr val="000000"/>
-              </a:buClr>
-              <a:buSzPts val="1200"/>
-              <a:buFont typeface="Arial"/>
-              <a:buNone/>
-              <a:defRPr b="0" i="0" sz="1200" u="none" cap="none" strike="noStrike">
-                <a:solidFill>
-                  <a:srgbClr val="888888"/>
-                </a:solidFill>
-                <a:latin typeface="Calibri"/>
-                <a:ea typeface="Calibri"/>
-                <a:cs typeface="Calibri"/>
-                <a:sym typeface="Calibri"/>
-              </a:defRPr>
-            </a:lvl2pPr>
-            <a:lvl3pPr indent="0" lvl="2" marL="0" marR="0" algn="r">
-              <a:lnSpc>
-                <a:spcPct val="100000"/>
-              </a:lnSpc>
-              <a:spcBef>
-                <a:spcPts val="0"/>
-              </a:spcBef>
-              <a:spcAft>
-                <a:spcPts val="0"/>
-              </a:spcAft>
-              <a:buClr>
-                <a:srgbClr val="000000"/>
-              </a:buClr>
-              <a:buSzPts val="1200"/>
-              <a:buFont typeface="Arial"/>
-              <a:buNone/>
-              <a:defRPr b="0" i="0" sz="1200" u="none" cap="none" strike="noStrike">
-                <a:solidFill>
-                  <a:srgbClr val="888888"/>
-                </a:solidFill>
-                <a:latin typeface="Calibri"/>
-                <a:ea typeface="Calibri"/>
-                <a:cs typeface="Calibri"/>
-                <a:sym typeface="Calibri"/>
-              </a:defRPr>
-            </a:lvl3pPr>
-            <a:lvl4pPr indent="0" lvl="3" marL="0" marR="0" algn="r">
-              <a:lnSpc>
-                <a:spcPct val="100000"/>
-              </a:lnSpc>
-              <a:spcBef>
-                <a:spcPts val="0"/>
-              </a:spcBef>
-              <a:spcAft>
-                <a:spcPts val="0"/>
-              </a:spcAft>
-              <a:buClr>
-                <a:srgbClr val="000000"/>
-              </a:buClr>
-              <a:buSzPts val="1200"/>
-              <a:buFont typeface="Arial"/>
-              <a:buNone/>
-              <a:defRPr b="0" i="0" sz="1200" u="none" cap="none" strike="noStrike">
-                <a:solidFill>
-                  <a:srgbClr val="888888"/>
-                </a:solidFill>
-                <a:latin typeface="Calibri"/>
-                <a:ea typeface="Calibri"/>
-                <a:cs typeface="Calibri"/>
-                <a:sym typeface="Calibri"/>
-              </a:defRPr>
-            </a:lvl4pPr>
-            <a:lvl5pPr indent="0" lvl="4" marL="0" marR="0" algn="r">
-              <a:lnSpc>
-                <a:spcPct val="100000"/>
-              </a:lnSpc>
-              <a:spcBef>
-                <a:spcPts val="0"/>
-              </a:spcBef>
-              <a:spcAft>
-                <a:spcPts val="0"/>
-              </a:spcAft>
-              <a:buClr>
-                <a:srgbClr val="000000"/>
-              </a:buClr>
-              <a:buSzPts val="1200"/>
-              <a:buFont typeface="Arial"/>
-              <a:buNone/>
-              <a:defRPr b="0" i="0" sz="1200" u="none" cap="none" strike="noStrike">
-                <a:solidFill>
-                  <a:srgbClr val="888888"/>
-                </a:solidFill>
-                <a:latin typeface="Calibri"/>
-                <a:ea typeface="Calibri"/>
-                <a:cs typeface="Calibri"/>
-                <a:sym typeface="Calibri"/>
-              </a:defRPr>
-            </a:lvl5pPr>
-            <a:lvl6pPr indent="0" lvl="5" marL="0" marR="0" algn="r">
-              <a:lnSpc>
-                <a:spcPct val="100000"/>
-              </a:lnSpc>
-              <a:spcBef>
-                <a:spcPts val="0"/>
-              </a:spcBef>
-              <a:spcAft>
-                <a:spcPts val="0"/>
-              </a:spcAft>
-              <a:buClr>
-                <a:srgbClr val="000000"/>
-              </a:buClr>
-              <a:buSzPts val="1200"/>
-              <a:buFont typeface="Arial"/>
-              <a:buNone/>
-              <a:defRPr b="0" i="0" sz="1200" u="none" cap="none" strike="noStrike">
-                <a:solidFill>
-                  <a:srgbClr val="888888"/>
-                </a:solidFill>
-                <a:latin typeface="Calibri"/>
-                <a:ea typeface="Calibri"/>
-                <a:cs typeface="Calibri"/>
-                <a:sym typeface="Calibri"/>
-              </a:defRPr>
-            </a:lvl6pPr>
-            <a:lvl7pPr indent="0" lvl="6" marL="0" marR="0" algn="r">
-              <a:lnSpc>
-                <a:spcPct val="100000"/>
-              </a:lnSpc>
-              <a:spcBef>
-                <a:spcPts val="0"/>
-              </a:spcBef>
-              <a:spcAft>
-                <a:spcPts val="0"/>
-              </a:spcAft>
-              <a:buClr>
-                <a:srgbClr val="000000"/>
-              </a:buClr>
-              <a:buSzPts val="1200"/>
-              <a:buFont typeface="Arial"/>
-              <a:buNone/>
-              <a:defRPr b="0" i="0" sz="1200" u="none" cap="none" strike="noStrike">
-                <a:solidFill>
-                  <a:srgbClr val="888888"/>
-                </a:solidFill>
-                <a:latin typeface="Calibri"/>
-                <a:ea typeface="Calibri"/>
-                <a:cs typeface="Calibri"/>
-                <a:sym typeface="Calibri"/>
-              </a:defRPr>
-            </a:lvl7pPr>
-            <a:lvl8pPr indent="0" lvl="7" marL="0" marR="0" algn="r">
-              <a:lnSpc>
-                <a:spcPct val="100000"/>
-              </a:lnSpc>
-              <a:spcBef>
-                <a:spcPts val="0"/>
-              </a:spcBef>
-              <a:spcAft>
-                <a:spcPts val="0"/>
-              </a:spcAft>
-              <a:buClr>
-                <a:srgbClr val="000000"/>
-              </a:buClr>
-              <a:buSzPts val="1200"/>
-              <a:buFont typeface="Arial"/>
-              <a:buNone/>
-              <a:defRPr b="0" i="0" sz="1200" u="none" cap="none" strike="noStrike">
-                <a:solidFill>
-                  <a:srgbClr val="888888"/>
-                </a:solidFill>
-                <a:latin typeface="Calibri"/>
-                <a:ea typeface="Calibri"/>
-                <a:cs typeface="Calibri"/>
-                <a:sym typeface="Calibri"/>
-              </a:defRPr>
-            </a:lvl8pPr>
-            <a:lvl9pPr indent="0" lvl="8" marL="0" marR="0" algn="r">
-              <a:lnSpc>
-                <a:spcPct val="100000"/>
-              </a:lnSpc>
-              <a:spcBef>
-                <a:spcPts val="0"/>
-              </a:spcBef>
-              <a:spcAft>
-                <a:spcPts val="0"/>
-              </a:spcAft>
-              <a:buClr>
-                <a:srgbClr val="000000"/>
-              </a:buClr>
-              <a:buSzPts val="1200"/>
-              <a:buFont typeface="Arial"/>
-              <a:buNone/>
-              <a:defRPr b="0" i="0" sz="1200" u="none" cap="none" strike="noStrike">
-                <a:solidFill>
-                  <a:srgbClr val="888888"/>
-                </a:solidFill>
-                <a:latin typeface="Calibri"/>
-                <a:ea typeface="Calibri"/>
-                <a:cs typeface="Calibri"/>
-                <a:sym typeface="Calibri"/>
-              </a:defRPr>
-            </a:lvl9pPr>
-          </a:lstStyle>
-          <a:p>
-            <a:pPr indent="0" lvl="0" marL="0" rtl="0" algn="r">
-              <a:spcBef>
-                <a:spcPts val="0"/>
-              </a:spcBef>
-              <a:spcAft>
-                <a:spcPts val="0"/>
-              </a:spcAft>
-              <a:buNone/>
-            </a:pPr>
-            <a:fld id="{00000000-1234-1234-1234-123412341234}" type="slidenum">
-              <a:rPr lang="en-US"/>
-              <a:t>‹#›</a:t>
-            </a:fld>
-            <a:endParaRPr/>
-          </a:p>
-        </p:txBody>
-      </p:sp>
-    </p:spTree>
-  </p:cSld>
-  <p:clrMapOvr>
-    <a:masterClrMapping/>
-  </p:clrMapOvr>
-</p:sldLayout>
-</file>
-
-<file path=ppt/slideLayouts/slideLayout3.xml><?xml version="1.0" encoding="utf-8"?>
-<p:sldLayout xmlns:a="http://schemas.openxmlformats.org/drawingml/2006/main" xmlns:r="http://schemas.openxmlformats.org/officeDocument/2006/relationships" xmlns:mc="http://schemas.openxmlformats.org/markup-compatibility/2006" xmlns:mv="urn:schemas-microsoft-com:mac:vml" xmlns:p="http://schemas.openxmlformats.org/presentationml/2006/main" xmlns:c="http://schemas.openxmlformats.org/drawingml/2006/chart" xmlns:dgm="http://schemas.openxmlformats.org/drawingml/2006/diagram" xmlns:o="urn:schemas-microsoft-com:office:office" xmlns:v="urn:schemas-microsoft-com:vml" xmlns:pvml="urn:schemas-microsoft-com:office:powerpoint" xmlns:com="http://schemas.openxmlformats.org/drawingml/2006/compatibility" xmlns:p14="http://schemas.microsoft.com/office/powerpoint/2010/main" xmlns:p15="http://schemas.microsoft.com/office/powerpoint/2012/main" xmlns:ahyp="http://schemas.microsoft.com/office/drawing/2018/hyperlinkcolor" matchingName="Title and Content" type="obj">
-  <p:cSld name="OBJECT">
-    <p:spTree>
-      <p:nvGrpSpPr>
-        <p:cNvPr id="28" name="Shape 28"/>
-        <p:cNvGrpSpPr/>
-        <p:nvPr/>
-      </p:nvGrpSpPr>
-      <p:grpSpPr>
-        <a:xfrm>
-          <a:off x="0" y="0"/>
-          <a:ext cx="0" cy="0"/>
-          <a:chOff x="0" y="0"/>
-          <a:chExt cx="0" cy="0"/>
-        </a:xfrm>
-      </p:grpSpPr>
-      <p:sp>
-        <p:nvSpPr>
-          <p:cNvPr id="29" name="Google Shape;29;p43"/>
-          <p:cNvSpPr txBox="1"/>
-          <p:nvPr>
-            <p:ph type="title"/>
-          </p:nvPr>
-        </p:nvSpPr>
-        <p:spPr>
-          <a:xfrm>
-            <a:off x="457200" y="274638"/>
-            <a:ext cx="8229600" cy="1143000"/>
-          </a:xfrm>
-          <a:prstGeom prst="rect">
-            <a:avLst/>
-          </a:prstGeom>
-          <a:noFill/>
-          <a:ln>
-            <a:noFill/>
-          </a:ln>
-        </p:spPr>
-        <p:txBody>
-          <a:bodyPr anchorCtr="0" anchor="ctr" bIns="45700" lIns="91425" spcFirstLastPara="1" rIns="91425" wrap="square" tIns="45700">
-            <a:normAutofit/>
-          </a:bodyPr>
-          <a:lstStyle>
-            <a:lvl1pPr lvl="0" algn="ctr">
-              <a:lnSpc>
-                <a:spcPct val="100000"/>
-              </a:lnSpc>
-              <a:spcBef>
-                <a:spcPts val="0"/>
-              </a:spcBef>
-              <a:spcAft>
-                <a:spcPts val="0"/>
-              </a:spcAft>
-              <a:buClr>
-                <a:schemeClr val="dk1"/>
-              </a:buClr>
-              <a:buSzPts val="1800"/>
-              <a:buNone/>
-              <a:defRPr/>
-            </a:lvl1pPr>
-            <a:lvl2pPr lvl="1" algn="l">
-              <a:lnSpc>
-                <a:spcPct val="100000"/>
-              </a:lnSpc>
-              <a:spcBef>
-                <a:spcPts val="0"/>
-              </a:spcBef>
-              <a:spcAft>
-                <a:spcPts val="0"/>
-              </a:spcAft>
-              <a:buSzPts val="1400"/>
-              <a:buNone/>
-              <a:defRPr/>
-            </a:lvl2pPr>
-            <a:lvl3pPr lvl="2" algn="l">
-              <a:lnSpc>
-                <a:spcPct val="100000"/>
-              </a:lnSpc>
-              <a:spcBef>
-                <a:spcPts val="0"/>
-              </a:spcBef>
-              <a:spcAft>
-                <a:spcPts val="0"/>
-              </a:spcAft>
-              <a:buSzPts val="1400"/>
-              <a:buNone/>
-              <a:defRPr/>
-            </a:lvl3pPr>
-            <a:lvl4pPr lvl="3" algn="l">
-              <a:lnSpc>
-                <a:spcPct val="100000"/>
-              </a:lnSpc>
-              <a:spcBef>
-                <a:spcPts val="0"/>
-              </a:spcBef>
-              <a:spcAft>
-                <a:spcPts val="0"/>
-              </a:spcAft>
-              <a:buSzPts val="1400"/>
-              <a:buNone/>
-              <a:defRPr/>
-            </a:lvl4pPr>
-            <a:lvl5pPr lvl="4" algn="l">
-              <a:lnSpc>
-                <a:spcPct val="100000"/>
-              </a:lnSpc>
-              <a:spcBef>
-                <a:spcPts val="0"/>
-              </a:spcBef>
-              <a:spcAft>
-                <a:spcPts val="0"/>
-              </a:spcAft>
-              <a:buSzPts val="1400"/>
-              <a:buNone/>
-              <a:defRPr/>
-            </a:lvl5pPr>
-            <a:lvl6pPr lvl="5" algn="l">
-              <a:lnSpc>
-                <a:spcPct val="100000"/>
-              </a:lnSpc>
-              <a:spcBef>
-                <a:spcPts val="0"/>
-              </a:spcBef>
-              <a:spcAft>
-                <a:spcPts val="0"/>
-              </a:spcAft>
-              <a:buSzPts val="1400"/>
-              <a:buNone/>
-              <a:defRPr/>
-            </a:lvl6pPr>
-            <a:lvl7pPr lvl="6" algn="l">
-              <a:lnSpc>
-                <a:spcPct val="100000"/>
-              </a:lnSpc>
-              <a:spcBef>
-                <a:spcPts val="0"/>
-              </a:spcBef>
-              <a:spcAft>
-                <a:spcPts val="0"/>
-              </a:spcAft>
-              <a:buSzPts val="1400"/>
-              <a:buNone/>
-              <a:defRPr/>
-            </a:lvl7pPr>
-            <a:lvl8pPr lvl="7" algn="l">
-              <a:lnSpc>
-                <a:spcPct val="100000"/>
-              </a:lnSpc>
-              <a:spcBef>
-                <a:spcPts val="0"/>
-              </a:spcBef>
-              <a:spcAft>
-                <a:spcPts val="0"/>
-              </a:spcAft>
-              <a:buSzPts val="1400"/>
-              <a:buNone/>
-              <a:defRPr/>
-            </a:lvl8pPr>
-            <a:lvl9pPr lvl="8" algn="l">
-              <a:lnSpc>
-                <a:spcPct val="100000"/>
-              </a:lnSpc>
-              <a:spcBef>
-                <a:spcPts val="0"/>
-              </a:spcBef>
-              <a:spcAft>
-                <a:spcPts val="0"/>
-              </a:spcAft>
-              <a:buSzPts val="1400"/>
-              <a:buNone/>
-              <a:defRPr/>
-            </a:lvl9pPr>
-          </a:lstStyle>
-          <a:p/>
-        </p:txBody>
-      </p:sp>
-      <p:sp>
-        <p:nvSpPr>
-          <p:cNvPr id="30" name="Google Shape;30;p43"/>
-          <p:cNvSpPr txBox="1"/>
-          <p:nvPr>
-            <p:ph idx="1" type="body"/>
-          </p:nvPr>
-        </p:nvSpPr>
-        <p:spPr>
-          <a:xfrm>
-            <a:off x="457200" y="1600200"/>
-            <a:ext cx="8229600" cy="4525963"/>
-          </a:xfrm>
-          <a:prstGeom prst="rect">
-            <a:avLst/>
-          </a:prstGeom>
-          <a:noFill/>
-          <a:ln>
-            <a:noFill/>
-          </a:ln>
-        </p:spPr>
-        <p:txBody>
-          <a:bodyPr anchorCtr="0" anchor="t" bIns="45700" lIns="91425" spcFirstLastPara="1" rIns="91425" wrap="square" tIns="45700">
-            <a:normAutofit/>
-          </a:bodyPr>
-          <a:lstStyle>
-            <a:lvl1pPr indent="-342900" lvl="0" marL="457200" algn="l">
-              <a:lnSpc>
-                <a:spcPct val="100000"/>
-              </a:lnSpc>
-              <a:spcBef>
-                <a:spcPts val="360"/>
-              </a:spcBef>
-              <a:spcAft>
-                <a:spcPts val="0"/>
-              </a:spcAft>
-              <a:buClr>
-                <a:schemeClr val="dk1"/>
-              </a:buClr>
-              <a:buSzPts val="1800"/>
-              <a:buChar char="•"/>
-              <a:defRPr/>
-            </a:lvl1pPr>
-            <a:lvl2pPr indent="-342900" lvl="1" marL="914400" algn="l">
-              <a:lnSpc>
-                <a:spcPct val="100000"/>
-              </a:lnSpc>
-              <a:spcBef>
-                <a:spcPts val="360"/>
-              </a:spcBef>
-              <a:spcAft>
-                <a:spcPts val="0"/>
-              </a:spcAft>
-              <a:buClr>
-                <a:schemeClr val="dk1"/>
-              </a:buClr>
-              <a:buSzPts val="1800"/>
-              <a:buChar char="–"/>
-              <a:defRPr/>
-            </a:lvl2pPr>
-            <a:lvl3pPr indent="-342900" lvl="2" marL="1371600" algn="l">
-              <a:lnSpc>
-                <a:spcPct val="100000"/>
-              </a:lnSpc>
-              <a:spcBef>
-                <a:spcPts val="360"/>
-              </a:spcBef>
-              <a:spcAft>
-                <a:spcPts val="0"/>
-              </a:spcAft>
-              <a:buClr>
-                <a:schemeClr val="dk1"/>
-              </a:buClr>
-              <a:buSzPts val="1800"/>
-              <a:buChar char="•"/>
-              <a:defRPr/>
-            </a:lvl3pPr>
-            <a:lvl4pPr indent="-342900" lvl="3" marL="1828800" algn="l">
-              <a:lnSpc>
-                <a:spcPct val="100000"/>
-              </a:lnSpc>
-              <a:spcBef>
-                <a:spcPts val="360"/>
-              </a:spcBef>
-              <a:spcAft>
-                <a:spcPts val="0"/>
-              </a:spcAft>
-              <a:buClr>
-                <a:schemeClr val="dk1"/>
-              </a:buClr>
-              <a:buSzPts val="1800"/>
-              <a:buChar char="–"/>
-              <a:defRPr/>
-            </a:lvl4pPr>
-            <a:lvl5pPr indent="-342900" lvl="4" marL="2286000" algn="l">
-              <a:lnSpc>
-                <a:spcPct val="100000"/>
-              </a:lnSpc>
-              <a:spcBef>
-                <a:spcPts val="360"/>
-              </a:spcBef>
-              <a:spcAft>
-                <a:spcPts val="0"/>
-              </a:spcAft>
-              <a:buClr>
-                <a:schemeClr val="dk1"/>
-              </a:buClr>
-              <a:buSzPts val="1800"/>
-              <a:buChar char="»"/>
-              <a:defRPr/>
-            </a:lvl5pPr>
-            <a:lvl6pPr indent="-342900" lvl="5" marL="2743200" algn="l">
-              <a:lnSpc>
-                <a:spcPct val="100000"/>
-              </a:lnSpc>
-              <a:spcBef>
-                <a:spcPts val="360"/>
-              </a:spcBef>
-              <a:spcAft>
-                <a:spcPts val="0"/>
-              </a:spcAft>
-              <a:buClr>
-                <a:schemeClr val="dk1"/>
-              </a:buClr>
-              <a:buSzPts val="1800"/>
-              <a:buChar char="•"/>
-              <a:defRPr/>
-            </a:lvl6pPr>
-            <a:lvl7pPr indent="-342900" lvl="6" marL="3200400" algn="l">
-              <a:lnSpc>
-                <a:spcPct val="100000"/>
-              </a:lnSpc>
-              <a:spcBef>
-                <a:spcPts val="360"/>
-              </a:spcBef>
-              <a:spcAft>
-                <a:spcPts val="0"/>
-              </a:spcAft>
-              <a:buClr>
-                <a:schemeClr val="dk1"/>
-              </a:buClr>
-              <a:buSzPts val="1800"/>
-              <a:buChar char="•"/>
-              <a:defRPr/>
-            </a:lvl7pPr>
-            <a:lvl8pPr indent="-342900" lvl="7" marL="3657600" algn="l">
-              <a:lnSpc>
-                <a:spcPct val="100000"/>
-              </a:lnSpc>
-              <a:spcBef>
-                <a:spcPts val="360"/>
-              </a:spcBef>
-              <a:spcAft>
-                <a:spcPts val="0"/>
-              </a:spcAft>
-              <a:buClr>
-                <a:schemeClr val="dk1"/>
-              </a:buClr>
-              <a:buSzPts val="1800"/>
-              <a:buChar char="•"/>
-              <a:defRPr/>
-            </a:lvl8pPr>
-            <a:lvl9pPr indent="-342900" lvl="8" marL="4114800" algn="l">
-              <a:lnSpc>
-                <a:spcPct val="100000"/>
-              </a:lnSpc>
-              <a:spcBef>
-                <a:spcPts val="360"/>
-              </a:spcBef>
-              <a:spcAft>
-                <a:spcPts val="0"/>
-              </a:spcAft>
-              <a:buClr>
-                <a:schemeClr val="dk1"/>
-              </a:buClr>
-              <a:buSzPts val="1800"/>
-              <a:buChar char="•"/>
-              <a:defRPr/>
-            </a:lvl9pPr>
-          </a:lstStyle>
-          <a:p/>
-        </p:txBody>
-      </p:sp>
-      <p:sp>
-        <p:nvSpPr>
-          <p:cNvPr id="31" name="Google Shape;31;p43"/>
-          <p:cNvSpPr txBox="1"/>
-          <p:nvPr>
-            <p:ph idx="10" type="dt"/>
-          </p:nvPr>
-        </p:nvSpPr>
-        <p:spPr>
-          <a:xfrm>
-            <a:off x="457200" y="6356350"/>
-            <a:ext cx="2133600" cy="365125"/>
-          </a:xfrm>
-          <a:prstGeom prst="rect">
-            <a:avLst/>
-          </a:prstGeom>
-          <a:noFill/>
-          <a:ln>
-            <a:noFill/>
-          </a:ln>
-        </p:spPr>
-        <p:txBody>
-          <a:bodyPr anchorCtr="0" anchor="ctr" bIns="45700" lIns="91425" spcFirstLastPara="1" rIns="91425" wrap="square" tIns="45700">
-            <a:noAutofit/>
-          </a:bodyPr>
-          <a:lstStyle>
-            <a:lvl1pPr lvl="0" algn="l">
-              <a:lnSpc>
-                <a:spcPct val="100000"/>
-              </a:lnSpc>
-              <a:spcBef>
-                <a:spcPts val="0"/>
-              </a:spcBef>
-              <a:spcAft>
-                <a:spcPts val="0"/>
-              </a:spcAft>
-              <a:buSzPts val="1400"/>
-              <a:buNone/>
-              <a:defRPr/>
-            </a:lvl1pPr>
-            <a:lvl2pPr lvl="1" algn="l">
-              <a:lnSpc>
-                <a:spcPct val="100000"/>
-              </a:lnSpc>
-              <a:spcBef>
-                <a:spcPts val="0"/>
-              </a:spcBef>
-              <a:spcAft>
-                <a:spcPts val="0"/>
-              </a:spcAft>
-              <a:buSzPts val="1400"/>
-              <a:buNone/>
-              <a:defRPr/>
-            </a:lvl2pPr>
-            <a:lvl3pPr lvl="2" algn="l">
-              <a:lnSpc>
-                <a:spcPct val="100000"/>
-              </a:lnSpc>
-              <a:spcBef>
-                <a:spcPts val="0"/>
-              </a:spcBef>
-              <a:spcAft>
-                <a:spcPts val="0"/>
-              </a:spcAft>
-              <a:buSzPts val="1400"/>
-              <a:buNone/>
-              <a:defRPr/>
-            </a:lvl3pPr>
-            <a:lvl4pPr lvl="3" algn="l">
-              <a:lnSpc>
-                <a:spcPct val="100000"/>
-              </a:lnSpc>
-              <a:spcBef>
-                <a:spcPts val="0"/>
-              </a:spcBef>
-              <a:spcAft>
-                <a:spcPts val="0"/>
-              </a:spcAft>
-              <a:buSzPts val="1400"/>
-              <a:buNone/>
-              <a:defRPr/>
-            </a:lvl4pPr>
-            <a:lvl5pPr lvl="4" algn="l">
-              <a:lnSpc>
-                <a:spcPct val="100000"/>
-              </a:lnSpc>
-              <a:spcBef>
-                <a:spcPts val="0"/>
-              </a:spcBef>
-              <a:spcAft>
-                <a:spcPts val="0"/>
-              </a:spcAft>
-              <a:buSzPts val="1400"/>
-              <a:buNone/>
-              <a:defRPr/>
-            </a:lvl5pPr>
-            <a:lvl6pPr lvl="5" algn="l">
-              <a:lnSpc>
-                <a:spcPct val="100000"/>
-              </a:lnSpc>
-              <a:spcBef>
-                <a:spcPts val="0"/>
-              </a:spcBef>
-              <a:spcAft>
-                <a:spcPts val="0"/>
-              </a:spcAft>
-              <a:buSzPts val="1400"/>
-              <a:buNone/>
-              <a:defRPr/>
-            </a:lvl6pPr>
-            <a:lvl7pPr lvl="6" algn="l">
-              <a:lnSpc>
-                <a:spcPct val="100000"/>
-              </a:lnSpc>
-              <a:spcBef>
-                <a:spcPts val="0"/>
-              </a:spcBef>
-              <a:spcAft>
-                <a:spcPts val="0"/>
-              </a:spcAft>
-              <a:buSzPts val="1400"/>
-              <a:buNone/>
-              <a:defRPr/>
-            </a:lvl7pPr>
-            <a:lvl8pPr lvl="7" algn="l">
-              <a:lnSpc>
-                <a:spcPct val="100000"/>
-              </a:lnSpc>
-              <a:spcBef>
-                <a:spcPts val="0"/>
-              </a:spcBef>
-              <a:spcAft>
-                <a:spcPts val="0"/>
-              </a:spcAft>
-              <a:buSzPts val="1400"/>
-              <a:buNone/>
-              <a:defRPr/>
-            </a:lvl8pPr>
-            <a:lvl9pPr lvl="8" algn="l">
-              <a:lnSpc>
-                <a:spcPct val="100000"/>
-              </a:lnSpc>
-              <a:spcBef>
-                <a:spcPts val="0"/>
-              </a:spcBef>
-              <a:spcAft>
-                <a:spcPts val="0"/>
-              </a:spcAft>
-              <a:buSzPts val="1400"/>
-              <a:buNone/>
-              <a:defRPr/>
-            </a:lvl9pPr>
-          </a:lstStyle>
-          <a:p/>
-        </p:txBody>
-      </p:sp>
-      <p:sp>
-        <p:nvSpPr>
-          <p:cNvPr id="32" name="Google Shape;32;p43"/>
-          <p:cNvSpPr txBox="1"/>
-          <p:nvPr>
-            <p:ph idx="11" type="ftr"/>
-          </p:nvPr>
-        </p:nvSpPr>
-        <p:spPr>
-          <a:xfrm>
-            <a:off x="3124200" y="6356350"/>
-            <a:ext cx="2895600" cy="365125"/>
-          </a:xfrm>
-          <a:prstGeom prst="rect">
-            <a:avLst/>
-          </a:prstGeom>
-          <a:noFill/>
-          <a:ln>
-            <a:noFill/>
-          </a:ln>
-        </p:spPr>
-        <p:txBody>
-          <a:bodyPr anchorCtr="0" anchor="ctr" bIns="45700" lIns="91425" spcFirstLastPara="1" rIns="91425" wrap="square" tIns="45700">
-            <a:noAutofit/>
-          </a:bodyPr>
-          <a:lstStyle>
-            <a:lvl1pPr lvl="0" algn="ctr">
-              <a:lnSpc>
-                <a:spcPct val="100000"/>
-              </a:lnSpc>
-              <a:spcBef>
-                <a:spcPts val="0"/>
-              </a:spcBef>
-              <a:spcAft>
-                <a:spcPts val="0"/>
-              </a:spcAft>
-              <a:buSzPts val="1400"/>
-              <a:buNone/>
-              <a:defRPr/>
-            </a:lvl1pPr>
-            <a:lvl2pPr lvl="1" algn="l">
-              <a:lnSpc>
-                <a:spcPct val="100000"/>
-              </a:lnSpc>
-              <a:spcBef>
-                <a:spcPts val="0"/>
-              </a:spcBef>
-              <a:spcAft>
-                <a:spcPts val="0"/>
-              </a:spcAft>
-              <a:buSzPts val="1400"/>
-              <a:buNone/>
-              <a:defRPr/>
-            </a:lvl2pPr>
-            <a:lvl3pPr lvl="2" algn="l">
-              <a:lnSpc>
-                <a:spcPct val="100000"/>
-              </a:lnSpc>
-              <a:spcBef>
-                <a:spcPts val="0"/>
-              </a:spcBef>
-              <a:spcAft>
-                <a:spcPts val="0"/>
-              </a:spcAft>
-              <a:buSzPts val="1400"/>
-              <a:buNone/>
-              <a:defRPr/>
-            </a:lvl3pPr>
-            <a:lvl4pPr lvl="3" algn="l">
-              <a:lnSpc>
-                <a:spcPct val="100000"/>
-              </a:lnSpc>
-              <a:spcBef>
-                <a:spcPts val="0"/>
-              </a:spcBef>
-              <a:spcAft>
-                <a:spcPts val="0"/>
-              </a:spcAft>
-              <a:buSzPts val="1400"/>
-              <a:buNone/>
-              <a:defRPr/>
-            </a:lvl4pPr>
-            <a:lvl5pPr lvl="4" algn="l">
-              <a:lnSpc>
-                <a:spcPct val="100000"/>
-              </a:lnSpc>
-              <a:spcBef>
-                <a:spcPts val="0"/>
-              </a:spcBef>
-              <a:spcAft>
-                <a:spcPts val="0"/>
-              </a:spcAft>
-              <a:buSzPts val="1400"/>
-              <a:buNone/>
-              <a:defRPr/>
-            </a:lvl5pPr>
-            <a:lvl6pPr lvl="5" algn="l">
-              <a:lnSpc>
-                <a:spcPct val="100000"/>
-              </a:lnSpc>
-              <a:spcBef>
-                <a:spcPts val="0"/>
-              </a:spcBef>
-              <a:spcAft>
-                <a:spcPts val="0"/>
-              </a:spcAft>
-              <a:buSzPts val="1400"/>
-              <a:buNone/>
-              <a:defRPr/>
-            </a:lvl6pPr>
-            <a:lvl7pPr lvl="6" algn="l">
-              <a:lnSpc>
-                <a:spcPct val="100000"/>
-              </a:lnSpc>
-              <a:spcBef>
-                <a:spcPts val="0"/>
-              </a:spcBef>
-              <a:spcAft>
-                <a:spcPts val="0"/>
-              </a:spcAft>
-              <a:buSzPts val="1400"/>
-              <a:buNone/>
-              <a:defRPr/>
-            </a:lvl7pPr>
-            <a:lvl8pPr lvl="7" algn="l">
-              <a:lnSpc>
-                <a:spcPct val="100000"/>
-              </a:lnSpc>
-              <a:spcBef>
-                <a:spcPts val="0"/>
-              </a:spcBef>
-              <a:spcAft>
-                <a:spcPts val="0"/>
-              </a:spcAft>
-              <a:buSzPts val="1400"/>
-              <a:buNone/>
-              <a:defRPr/>
-            </a:lvl8pPr>
-            <a:lvl9pPr lvl="8" algn="l">
-              <a:lnSpc>
-                <a:spcPct val="100000"/>
-              </a:lnSpc>
-              <a:spcBef>
-                <a:spcPts val="0"/>
-              </a:spcBef>
-              <a:spcAft>
-                <a:spcPts val="0"/>
-              </a:spcAft>
-              <a:buSzPts val="1400"/>
-              <a:buNone/>
-              <a:defRPr/>
-            </a:lvl9pPr>
-          </a:lstStyle>
-          <a:p/>
-        </p:txBody>
-      </p:sp>
-      <p:sp>
-        <p:nvSpPr>
-          <p:cNvPr id="33" name="Google Shape;33;p43"/>
+          <p:cNvPr id="33" name="Google Shape;33;p42"/>
           <p:cNvSpPr txBox="1"/>
           <p:nvPr>
             <p:ph idx="12" type="sldNum"/>
@@ -17261,7 +17631,7 @@
             </a:pPr>
             <a:r>
               <a:rPr lang="en-US"/>
-              <a:t>Fall 2023</a:t>
+              <a:t>Fall 2024</a:t>
             </a:r>
             <a:endParaRPr/>
           </a:p>
@@ -17381,6 +17751,7 @@
               <a:spcAft>
                 <a:spcPts val="0"/>
               </a:spcAft>
+              <a:buSzPts val="1800"/>
               <a:buNone/>
             </a:pPr>
             <a:r>
@@ -17432,6 +17803,10 @@
           <a:prstGeom prst="rect">
             <a:avLst/>
           </a:prstGeom>
+          <a:noFill/>
+          <a:ln>
+            <a:noFill/>
+          </a:ln>
         </p:spPr>
         <p:txBody>
           <a:bodyPr anchorCtr="0" anchor="ctr" bIns="45700" lIns="91425" spcFirstLastPara="1" rIns="91425" wrap="square" tIns="45700">
@@ -17440,12 +17815,16 @@
           <a:lstStyle/>
           <a:p>
             <a:pPr indent="0" lvl="0" marL="0" rtl="0" algn="ctr">
-              <a:spcBef>
-                <a:spcPts val="0"/>
-              </a:spcBef>
-              <a:spcAft>
-                <a:spcPts val="0"/>
-              </a:spcAft>
+              <a:lnSpc>
+                <a:spcPct val="100000"/>
+              </a:lnSpc>
+              <a:spcBef>
+                <a:spcPts val="0"/>
+              </a:spcBef>
+              <a:spcAft>
+                <a:spcPts val="0"/>
+              </a:spcAft>
+              <a:buSzPts val="1800"/>
               <a:buNone/>
             </a:pPr>
             <a:r>
@@ -17472,6 +17851,10 @@
           <a:prstGeom prst="rect">
             <a:avLst/>
           </a:prstGeom>
+          <a:noFill/>
+          <a:ln>
+            <a:noFill/>
+          </a:ln>
         </p:spPr>
         <p:txBody>
           <a:bodyPr anchorCtr="0" anchor="t" bIns="45700" lIns="91425" spcFirstLastPara="1" rIns="91425" wrap="square" tIns="45700">
@@ -17545,11 +17928,7 @@
             </a:pPr>
             <a:r>
               <a:rPr lang="en-US" sz="2800"/>
-              <a:t>If you have not yet established services through DRS, but have a temporary health condition or permanent disability that requires accommodations, contact DRS </a:t>
-            </a:r>
-            <a:r>
-              <a:rPr lang="en-US" sz="2800"/>
-              <a:t>at </a:t>
+              <a:t>If you have not yet established services through DRS, but have a temporary health condition or permanent disability that requires accommodations, contact DRS at </a:t>
             </a:r>
             <a:r>
               <a:rPr lang="en-US" sz="2800" u="sng">
@@ -17568,11 +17947,7 @@
             </a:r>
             <a:r>
               <a:rPr lang="en-US" sz="2800"/>
-              <a:t> </a:t>
-            </a:r>
-            <a:r>
-              <a:rPr lang="en-US" sz="2800"/>
-              <a:t>to set up an Access Plan.</a:t>
+              <a:t> to set up an Access Plan.</a:t>
             </a:r>
             <a:endParaRPr sz="2800"/>
           </a:p>
@@ -17619,6 +17994,10 @@
           <a:prstGeom prst="rect">
             <a:avLst/>
           </a:prstGeom>
+          <a:noFill/>
+          <a:ln>
+            <a:noFill/>
+          </a:ln>
         </p:spPr>
         <p:txBody>
           <a:bodyPr anchorCtr="0" anchor="ctr" bIns="45700" lIns="91425" spcFirstLastPara="1" rIns="91425" wrap="square" tIns="45700">
@@ -17627,12 +18006,16 @@
           <a:lstStyle/>
           <a:p>
             <a:pPr indent="0" lvl="0" marL="0" rtl="0" algn="ctr">
-              <a:spcBef>
-                <a:spcPts val="0"/>
-              </a:spcBef>
-              <a:spcAft>
-                <a:spcPts val="0"/>
-              </a:spcAft>
+              <a:lnSpc>
+                <a:spcPct val="100000"/>
+              </a:lnSpc>
+              <a:spcBef>
+                <a:spcPts val="0"/>
+              </a:spcBef>
+              <a:spcAft>
+                <a:spcPts val="0"/>
+              </a:spcAft>
+              <a:buSzPts val="1800"/>
               <a:buNone/>
             </a:pPr>
             <a:r>
@@ -17659,6 +18042,10 @@
           <a:prstGeom prst="rect">
             <a:avLst/>
           </a:prstGeom>
+          <a:noFill/>
+          <a:ln>
+            <a:noFill/>
+          </a:ln>
         </p:spPr>
         <p:txBody>
           <a:bodyPr anchorCtr="0" anchor="t" bIns="45700" lIns="91425" spcFirstLastPara="1" rIns="91425" wrap="square" tIns="45700">
@@ -17857,6 +18244,10 @@
           <a:prstGeom prst="rect">
             <a:avLst/>
           </a:prstGeom>
+          <a:noFill/>
+          <a:ln>
+            <a:noFill/>
+          </a:ln>
         </p:spPr>
         <p:txBody>
           <a:bodyPr anchorCtr="0" anchor="ctr" bIns="45700" lIns="91425" spcFirstLastPara="1" rIns="91425" wrap="square" tIns="45700">
@@ -17865,12 +18256,16 @@
           <a:lstStyle/>
           <a:p>
             <a:pPr indent="0" lvl="0" marL="0" rtl="0" algn="ctr">
-              <a:spcBef>
-                <a:spcPts val="0"/>
-              </a:spcBef>
-              <a:spcAft>
-                <a:spcPts val="0"/>
-              </a:spcAft>
+              <a:lnSpc>
+                <a:spcPct val="100000"/>
+              </a:lnSpc>
+              <a:spcBef>
+                <a:spcPts val="0"/>
+              </a:spcBef>
+              <a:spcAft>
+                <a:spcPts val="0"/>
+              </a:spcAft>
+              <a:buSzPts val="1800"/>
               <a:buNone/>
             </a:pPr>
             <a:r>
@@ -17897,6 +18292,10 @@
           <a:prstGeom prst="rect">
             <a:avLst/>
           </a:prstGeom>
+          <a:noFill/>
+          <a:ln>
+            <a:noFill/>
+          </a:ln>
         </p:spPr>
         <p:txBody>
           <a:bodyPr anchorCtr="0" anchor="t" bIns="45700" lIns="91425" spcFirstLastPara="1" rIns="91425" wrap="square" tIns="45700">
@@ -17905,6 +18304,9 @@
           <a:lstStyle/>
           <a:p>
             <a:pPr indent="-419100" lvl="0" marL="457200" rtl="0" algn="l">
+              <a:lnSpc>
+                <a:spcPct val="100000"/>
+              </a:lnSpc>
               <a:spcBef>
                 <a:spcPts val="360"/>
               </a:spcBef>
@@ -17922,12 +18324,16 @@
           </a:p>
           <a:p>
             <a:pPr indent="0" lvl="0" marL="0" rtl="0" algn="l">
+              <a:lnSpc>
+                <a:spcPct val="100000"/>
+              </a:lnSpc>
               <a:spcBef>
                 <a:spcPts val="360"/>
               </a:spcBef>
               <a:spcAft>
                 <a:spcPts val="0"/>
               </a:spcAft>
+              <a:buSzPts val="1800"/>
               <a:buNone/>
             </a:pPr>
             <a:r>
@@ -17937,6 +18343,9 @@
           </a:p>
           <a:p>
             <a:pPr indent="-419100" lvl="0" marL="457200" rtl="0" algn="l">
+              <a:lnSpc>
+                <a:spcPct val="100000"/>
+              </a:lnSpc>
               <a:spcBef>
                 <a:spcPts val="360"/>
               </a:spcBef>
@@ -17954,12 +18363,16 @@
           </a:p>
           <a:p>
             <a:pPr indent="0" lvl="0" marL="0" rtl="0" algn="l">
+              <a:lnSpc>
+                <a:spcPct val="100000"/>
+              </a:lnSpc>
               <a:spcBef>
                 <a:spcPts val="360"/>
               </a:spcBef>
               <a:spcAft>
                 <a:spcPts val="0"/>
               </a:spcAft>
+              <a:buSzPts val="1800"/>
               <a:buNone/>
             </a:pPr>
             <a:r>
@@ -17969,6 +18382,9 @@
           </a:p>
           <a:p>
             <a:pPr indent="-419100" lvl="0" marL="457200" rtl="0" algn="l">
+              <a:lnSpc>
+                <a:spcPct val="100000"/>
+              </a:lnSpc>
               <a:spcBef>
                 <a:spcPts val="360"/>
               </a:spcBef>
@@ -17980,18 +18396,22 @@
             </a:pPr>
             <a:r>
               <a:rPr lang="en-US" sz="3000"/>
-              <a:t>Labs (Tuesdays 11:30-12:20)</a:t>
+              <a:t>Labs (usually following the tutorial)</a:t>
             </a:r>
             <a:endParaRPr sz="3000"/>
           </a:p>
           <a:p>
             <a:pPr indent="0" lvl="0" marL="457200" rtl="0" algn="l">
+              <a:lnSpc>
+                <a:spcPct val="100000"/>
+              </a:lnSpc>
               <a:spcBef>
                 <a:spcPts val="360"/>
               </a:spcBef>
               <a:spcAft>
                 <a:spcPts val="0"/>
               </a:spcAft>
+              <a:buSzPts val="1800"/>
               <a:buNone/>
             </a:pPr>
             <a:r>
@@ -18042,6 +18462,10 @@
           <a:prstGeom prst="rect">
             <a:avLst/>
           </a:prstGeom>
+          <a:noFill/>
+          <a:ln>
+            <a:noFill/>
+          </a:ln>
         </p:spPr>
         <p:txBody>
           <a:bodyPr anchorCtr="0" anchor="ctr" bIns="45700" lIns="91425" spcFirstLastPara="1" rIns="91425" wrap="square" tIns="45700">
@@ -18050,12 +18474,16 @@
           <a:lstStyle/>
           <a:p>
             <a:pPr indent="0" lvl="0" marL="0" rtl="0" algn="ctr">
-              <a:spcBef>
-                <a:spcPts val="0"/>
-              </a:spcBef>
-              <a:spcAft>
-                <a:spcPts val="0"/>
-              </a:spcAft>
+              <a:lnSpc>
+                <a:spcPct val="100000"/>
+              </a:lnSpc>
+              <a:spcBef>
+                <a:spcPts val="0"/>
+              </a:spcBef>
+              <a:spcAft>
+                <a:spcPts val="0"/>
+              </a:spcAft>
+              <a:buSzPts val="1800"/>
               <a:buNone/>
             </a:pPr>
             <a:r>
@@ -18082,6 +18510,10 @@
           <a:prstGeom prst="rect">
             <a:avLst/>
           </a:prstGeom>
+          <a:noFill/>
+          <a:ln>
+            <a:noFill/>
+          </a:ln>
         </p:spPr>
         <p:txBody>
           <a:bodyPr anchorCtr="0" anchor="t" bIns="45700" lIns="91425" spcFirstLastPara="1" rIns="91425" wrap="square" tIns="45700">
@@ -18090,6 +18522,9 @@
           <a:lstStyle/>
           <a:p>
             <a:pPr indent="-419100" lvl="0" marL="457200" rtl="0" algn="l">
+              <a:lnSpc>
+                <a:spcPct val="100000"/>
+              </a:lnSpc>
               <a:spcBef>
                 <a:spcPts val="360"/>
               </a:spcBef>
@@ -18101,26 +18536,22 @@
             </a:pPr>
             <a:r>
               <a:rPr lang="en-US" sz="3000"/>
-              <a:t>In-class quizzes at the </a:t>
-            </a:r>
-            <a:r>
-              <a:rPr lang="en-US" sz="3000"/>
-              <a:t>beginning</a:t>
-            </a:r>
-            <a:r>
-              <a:rPr lang="en-US" sz="3000"/>
-              <a:t> of class on 10/19, 11/02 and 11/16.</a:t>
+              <a:t>In-class quizzes during the 2nd hour of class on 10/15, 10/29 and 11/12.</a:t>
             </a:r>
             <a:endParaRPr sz="3000"/>
           </a:p>
           <a:p>
             <a:pPr indent="0" lvl="0" marL="0" rtl="0" algn="l">
+              <a:lnSpc>
+                <a:spcPct val="100000"/>
+              </a:lnSpc>
               <a:spcBef>
                 <a:spcPts val="360"/>
               </a:spcBef>
               <a:spcAft>
                 <a:spcPts val="0"/>
               </a:spcAft>
+              <a:buSzPts val="1800"/>
               <a:buNone/>
             </a:pPr>
             <a:r>
@@ -18130,6 +18561,9 @@
           </a:p>
           <a:p>
             <a:pPr indent="-419100" lvl="0" marL="457200" rtl="0" algn="l">
+              <a:lnSpc>
+                <a:spcPct val="100000"/>
+              </a:lnSpc>
               <a:spcBef>
                 <a:spcPts val="360"/>
               </a:spcBef>
@@ -18141,18 +18575,22 @@
             </a:pPr>
             <a:r>
               <a:rPr lang="en-US" sz="3000"/>
-              <a:t>About 10-15 minutes.</a:t>
+              <a:t>About 30-45 minutes.</a:t>
             </a:r>
             <a:endParaRPr sz="3000"/>
           </a:p>
           <a:p>
             <a:pPr indent="0" lvl="0" marL="0" rtl="0" algn="l">
+              <a:lnSpc>
+                <a:spcPct val="100000"/>
+              </a:lnSpc>
               <a:spcBef>
                 <a:spcPts val="360"/>
               </a:spcBef>
               <a:spcAft>
                 <a:spcPts val="0"/>
               </a:spcAft>
+              <a:buSzPts val="1800"/>
               <a:buNone/>
             </a:pPr>
             <a:r>
@@ -18162,6 +18600,9 @@
           </a:p>
           <a:p>
             <a:pPr indent="-419100" lvl="0" marL="457200" rtl="0" algn="l">
+              <a:lnSpc>
+                <a:spcPct val="100000"/>
+              </a:lnSpc>
               <a:spcBef>
                 <a:spcPts val="360"/>
               </a:spcBef>
@@ -18173,15 +18614,7 @@
             </a:pPr>
             <a:r>
               <a:rPr lang="en-US" sz="3000"/>
-              <a:t>General questions about data visualization </a:t>
-            </a:r>
-            <a:r>
-              <a:rPr lang="en-US" sz="3000"/>
-              <a:t>principles</a:t>
-            </a:r>
-            <a:r>
-              <a:rPr lang="en-US" sz="3000"/>
-              <a:t> from the lectures.</a:t>
+              <a:t>General questions about data visualization principles from the lectures.</a:t>
             </a:r>
             <a:endParaRPr sz="3000"/>
           </a:p>
@@ -18228,6 +18661,10 @@
           <a:prstGeom prst="rect">
             <a:avLst/>
           </a:prstGeom>
+          <a:noFill/>
+          <a:ln>
+            <a:noFill/>
+          </a:ln>
         </p:spPr>
         <p:txBody>
           <a:bodyPr anchorCtr="0" anchor="ctr" bIns="45700" lIns="91425" spcFirstLastPara="1" rIns="91425" wrap="square" tIns="45700">
@@ -18236,12 +18673,16 @@
           <a:lstStyle/>
           <a:p>
             <a:pPr indent="0" lvl="0" marL="0" rtl="0" algn="ctr">
-              <a:spcBef>
-                <a:spcPts val="0"/>
-              </a:spcBef>
-              <a:spcAft>
-                <a:spcPts val="0"/>
-              </a:spcAft>
+              <a:lnSpc>
+                <a:spcPct val="100000"/>
+              </a:lnSpc>
+              <a:spcBef>
+                <a:spcPts val="0"/>
+              </a:spcBef>
+              <a:spcAft>
+                <a:spcPts val="0"/>
+              </a:spcAft>
+              <a:buSzPts val="1800"/>
               <a:buNone/>
             </a:pPr>
             <a:r>
@@ -18268,14 +18709,21 @@
           <a:prstGeom prst="rect">
             <a:avLst/>
           </a:prstGeom>
+          <a:noFill/>
+          <a:ln>
+            <a:noFill/>
+          </a:ln>
         </p:spPr>
         <p:txBody>
           <a:bodyPr anchorCtr="0" anchor="t" bIns="45700" lIns="91425" spcFirstLastPara="1" rIns="91425" wrap="square" tIns="45700">
-            <a:normAutofit/>
+            <a:normAutofit lnSpcReduction="10000"/>
           </a:bodyPr>
           <a:lstStyle/>
           <a:p>
             <a:pPr indent="-419100" lvl="0" marL="457200" rtl="0" algn="l">
+              <a:lnSpc>
+                <a:spcPct val="100000"/>
+              </a:lnSpc>
               <a:spcBef>
                 <a:spcPts val="360"/>
               </a:spcBef>
@@ -18287,12 +18735,15 @@
             </a:pPr>
             <a:r>
               <a:rPr lang="en-US" sz="3000"/>
-              <a:t>Two homeworks due on 10/19 and 11/02.</a:t>
+              <a:t>Two homeworks due on 10/06 and 10/13 (homework 1) and on 10/20 and 10/27 (homework 2).</a:t>
             </a:r>
             <a:endParaRPr sz="3000"/>
           </a:p>
           <a:p>
             <a:pPr indent="-419100" lvl="0" marL="457200" rtl="0" algn="l">
+              <a:lnSpc>
+                <a:spcPct val="100000"/>
+              </a:lnSpc>
               <a:spcBef>
                 <a:spcPts val="0"/>
               </a:spcBef>
@@ -18304,12 +18755,15 @@
             </a:pPr>
             <a:r>
               <a:rPr lang="en-US" sz="3000"/>
-              <a:t>You will be given a dataset and you will choose a question that you want to answer about this dataset.</a:t>
+              <a:t>You will be given a dataset and you will explore the dataset and choose a question that you want to answer about this dataset.</a:t>
             </a:r>
             <a:endParaRPr sz="3000"/>
           </a:p>
           <a:p>
             <a:pPr indent="-419100" lvl="0" marL="457200" rtl="0" algn="l">
+              <a:lnSpc>
+                <a:spcPct val="100000"/>
+              </a:lnSpc>
               <a:spcBef>
                 <a:spcPts val="0"/>
               </a:spcBef>
@@ -18321,20 +18775,15 @@
             </a:pPr>
             <a:r>
               <a:rPr lang="en-US" sz="3000"/>
-              <a:t>Then you will make a visual that </a:t>
-            </a:r>
-            <a:r>
-              <a:rPr lang="en-US" sz="3000"/>
-              <a:t>helps</a:t>
-            </a:r>
-            <a:r>
-              <a:rPr lang="en-US" sz="3000"/>
-              <a:t> answering your question.</a:t>
+              <a:t>Then you will make a visual that helps answering your question.</a:t>
             </a:r>
             <a:endParaRPr sz="3000"/>
           </a:p>
           <a:p>
             <a:pPr indent="-419100" lvl="0" marL="457200" rtl="0" algn="l">
+              <a:lnSpc>
+                <a:spcPct val="100000"/>
+              </a:lnSpc>
               <a:spcBef>
                 <a:spcPts val="0"/>
               </a:spcBef>
@@ -18346,23 +18795,7 @@
             </a:pPr>
             <a:r>
               <a:rPr lang="en-US" sz="3000"/>
-              <a:t>You will also write a few </a:t>
-            </a:r>
-            <a:r>
-              <a:rPr lang="en-US" sz="3000"/>
-              <a:t>paragraphs</a:t>
-            </a:r>
-            <a:r>
-              <a:rPr lang="en-US" sz="3000"/>
-              <a:t> </a:t>
-            </a:r>
-            <a:r>
-              <a:rPr lang="en-US" sz="3000"/>
-              <a:t>describing</a:t>
-            </a:r>
-            <a:r>
-              <a:rPr lang="en-US" sz="3000"/>
-              <a:t> your question and your design.</a:t>
+              <a:t>You will also write a few paragraphs describing your question and your design.</a:t>
             </a:r>
             <a:endParaRPr sz="3000"/>
           </a:p>
@@ -18409,6 +18842,10 @@
           <a:prstGeom prst="rect">
             <a:avLst/>
           </a:prstGeom>
+          <a:noFill/>
+          <a:ln>
+            <a:noFill/>
+          </a:ln>
         </p:spPr>
         <p:txBody>
           <a:bodyPr anchorCtr="0" anchor="ctr" bIns="45700" lIns="91425" spcFirstLastPara="1" rIns="91425" wrap="square" tIns="45700">
@@ -18417,12 +18854,16 @@
           <a:lstStyle/>
           <a:p>
             <a:pPr indent="0" lvl="0" marL="0" rtl="0" algn="ctr">
-              <a:spcBef>
-                <a:spcPts val="0"/>
-              </a:spcBef>
-              <a:spcAft>
-                <a:spcPts val="0"/>
-              </a:spcAft>
+              <a:lnSpc>
+                <a:spcPct val="100000"/>
+              </a:lnSpc>
+              <a:spcBef>
+                <a:spcPts val="0"/>
+              </a:spcBef>
+              <a:spcAft>
+                <a:spcPts val="0"/>
+              </a:spcAft>
+              <a:buSzPts val="1800"/>
               <a:buNone/>
             </a:pPr>
             <a:r>
@@ -18449,6 +18890,10 @@
           <a:prstGeom prst="rect">
             <a:avLst/>
           </a:prstGeom>
+          <a:noFill/>
+          <a:ln>
+            <a:noFill/>
+          </a:ln>
         </p:spPr>
         <p:txBody>
           <a:bodyPr anchorCtr="0" anchor="t" bIns="45700" lIns="91425" spcFirstLastPara="1" rIns="91425" wrap="square" tIns="45700">
@@ -18457,8 +18902,11 @@
           <a:lstStyle/>
           <a:p>
             <a:pPr indent="-419100" lvl="0" marL="457200" rtl="0" algn="l">
-              <a:spcBef>
-                <a:spcPts val="360"/>
+              <a:lnSpc>
+                <a:spcPct val="100000"/>
+              </a:lnSpc>
+              <a:spcBef>
+                <a:spcPts val="0"/>
               </a:spcBef>
               <a:spcAft>
                 <a:spcPts val="0"/>
@@ -18468,37 +18916,33 @@
             </a:pPr>
             <a:r>
               <a:rPr lang="en-US" sz="3000"/>
-              <a:t>We will review together the submissions of the student.</a:t>
+              <a:t>You will have to fill a feedback form for 4 visuals created by other students in the class.</a:t>
+            </a:r>
+            <a:endParaRPr sz="3000"/>
+          </a:p>
+          <a:p>
+            <a:pPr indent="0" lvl="0" marL="0" rtl="0" algn="l">
+              <a:lnSpc>
+                <a:spcPct val="100000"/>
+              </a:lnSpc>
+              <a:spcBef>
+                <a:spcPts val="0"/>
+              </a:spcBef>
+              <a:spcAft>
+                <a:spcPts val="0"/>
+              </a:spcAft>
+              <a:buNone/>
+            </a:pPr>
+            <a:r>
+              <a:t/>
             </a:r>
             <a:endParaRPr sz="3000"/>
           </a:p>
           <a:p>
             <a:pPr indent="-419100" lvl="0" marL="457200" rtl="0" algn="l">
-              <a:spcBef>
-                <a:spcPts val="0"/>
-              </a:spcBef>
-              <a:spcAft>
-                <a:spcPts val="0"/>
-              </a:spcAft>
-              <a:buSzPts val="3000"/>
-              <a:buChar char="•"/>
-            </a:pPr>
-            <a:r>
-              <a:rPr lang="en-US" sz="3000"/>
-              <a:t>I will </a:t>
-            </a:r>
-            <a:r>
-              <a:rPr lang="en-US" sz="3000"/>
-              <a:t>divide</a:t>
-            </a:r>
-            <a:r>
-              <a:rPr lang="en-US" sz="3000"/>
-              <a:t> the class into 2 to 3 groups and will fill a feedback form for each of the submissions from your group.</a:t>
-            </a:r>
-            <a:endParaRPr sz="3000"/>
-          </a:p>
-          <a:p>
-            <a:pPr indent="-419100" lvl="0" marL="457200" rtl="0" algn="l">
+              <a:lnSpc>
+                <a:spcPct val="100000"/>
+              </a:lnSpc>
               <a:spcBef>
                 <a:spcPts val="0"/>
               </a:spcBef>
@@ -18515,7 +18959,28 @@
             <a:endParaRPr sz="3000"/>
           </a:p>
           <a:p>
+            <a:pPr indent="0" lvl="0" marL="0" rtl="0" algn="l">
+              <a:lnSpc>
+                <a:spcPct val="100000"/>
+              </a:lnSpc>
+              <a:spcBef>
+                <a:spcPts val="0"/>
+              </a:spcBef>
+              <a:spcAft>
+                <a:spcPts val="0"/>
+              </a:spcAft>
+              <a:buNone/>
+            </a:pPr>
+            <a:r>
+              <a:t/>
+            </a:r>
+            <a:endParaRPr sz="3000"/>
+          </a:p>
+          <a:p>
             <a:pPr indent="-419100" lvl="0" marL="457200" rtl="0" algn="l">
+              <a:lnSpc>
+                <a:spcPct val="100000"/>
+              </a:lnSpc>
               <a:spcBef>
                 <a:spcPts val="0"/>
               </a:spcBef>
@@ -18527,7 +18992,7 @@
             </a:pPr>
             <a:r>
               <a:rPr lang="en-US" sz="3000"/>
-              <a:t>3 feedbacks for homework 1, homework 2 and the first part of the final project.</a:t>
+              <a:t>2 feedbacks for homework 1 and homework 2.</a:t>
             </a:r>
             <a:endParaRPr sz="3000"/>
           </a:p>
@@ -18574,6 +19039,10 @@
           <a:prstGeom prst="rect">
             <a:avLst/>
           </a:prstGeom>
+          <a:noFill/>
+          <a:ln>
+            <a:noFill/>
+          </a:ln>
         </p:spPr>
         <p:txBody>
           <a:bodyPr anchorCtr="0" anchor="ctr" bIns="45700" lIns="91425" spcFirstLastPara="1" rIns="91425" wrap="square" tIns="45700">
@@ -18582,12 +19051,16 @@
           <a:lstStyle/>
           <a:p>
             <a:pPr indent="0" lvl="0" marL="0" rtl="0" algn="ctr">
-              <a:spcBef>
-                <a:spcPts val="0"/>
-              </a:spcBef>
-              <a:spcAft>
-                <a:spcPts val="0"/>
-              </a:spcAft>
+              <a:lnSpc>
+                <a:spcPct val="100000"/>
+              </a:lnSpc>
+              <a:spcBef>
+                <a:spcPts val="0"/>
+              </a:spcBef>
+              <a:spcAft>
+                <a:spcPts val="0"/>
+              </a:spcAft>
+              <a:buSzPts val="1800"/>
               <a:buNone/>
             </a:pPr>
             <a:r>
@@ -18614,6 +19087,10 @@
           <a:prstGeom prst="rect">
             <a:avLst/>
           </a:prstGeom>
+          <a:noFill/>
+          <a:ln>
+            <a:noFill/>
+          </a:ln>
         </p:spPr>
         <p:txBody>
           <a:bodyPr anchorCtr="0" anchor="t" bIns="45700" lIns="91425" spcFirstLastPara="1" rIns="91425" wrap="square" tIns="45700">
@@ -18622,6 +19099,9 @@
           <a:lstStyle/>
           <a:p>
             <a:pPr indent="-419100" lvl="0" marL="457200" rtl="0" algn="l">
+              <a:lnSpc>
+                <a:spcPct val="100000"/>
+              </a:lnSpc>
               <a:spcBef>
                 <a:spcPts val="360"/>
               </a:spcBef>
@@ -18633,18 +19113,22 @@
             </a:pPr>
             <a:r>
               <a:rPr lang="en-US" sz="3000"/>
-              <a:t>In-class presentations on 12/07 (last day of class) and 12/11 (final exam time slot).</a:t>
+              <a:t>In-class presentations on 12/03 and  12/05 (last week of the quarter).</a:t>
             </a:r>
             <a:endParaRPr sz="3000"/>
           </a:p>
           <a:p>
             <a:pPr indent="0" lvl="0" marL="0" rtl="0" algn="l">
+              <a:lnSpc>
+                <a:spcPct val="100000"/>
+              </a:lnSpc>
               <a:spcBef>
                 <a:spcPts val="360"/>
               </a:spcBef>
               <a:spcAft>
                 <a:spcPts val="0"/>
               </a:spcAft>
+              <a:buSzPts val="1800"/>
               <a:buNone/>
             </a:pPr>
             <a:r>
@@ -18654,6 +19138,9 @@
           </a:p>
           <a:p>
             <a:pPr indent="-419100" lvl="0" marL="457200" rtl="0" algn="l">
+              <a:lnSpc>
+                <a:spcPct val="100000"/>
+              </a:lnSpc>
               <a:spcBef>
                 <a:spcPts val="360"/>
               </a:spcBef>
@@ -18671,12 +19158,16 @@
           </a:p>
           <a:p>
             <a:pPr indent="0" lvl="0" marL="0" rtl="0" algn="l">
+              <a:lnSpc>
+                <a:spcPct val="100000"/>
+              </a:lnSpc>
               <a:spcBef>
                 <a:spcPts val="360"/>
               </a:spcBef>
               <a:spcAft>
                 <a:spcPts val="0"/>
               </a:spcAft>
+              <a:buSzPts val="1800"/>
               <a:buNone/>
             </a:pPr>
             <a:r>
@@ -18686,6 +19177,9 @@
           </a:p>
           <a:p>
             <a:pPr indent="-419100" lvl="0" marL="457200" rtl="0" algn="l">
+              <a:lnSpc>
+                <a:spcPct val="100000"/>
+              </a:lnSpc>
               <a:spcBef>
                 <a:spcPts val="360"/>
               </a:spcBef>
@@ -18697,18 +19191,22 @@
             </a:pPr>
             <a:r>
               <a:rPr lang="en-US" sz="3000"/>
-              <a:t>Depending on the number of students registered for the class, you may be allowed to work in teams of 2 students.</a:t>
+              <a:t>Depending on the number of students registered for the class, you will work in teams of 4 to 5 students.</a:t>
             </a:r>
             <a:endParaRPr sz="3000"/>
           </a:p>
           <a:p>
             <a:pPr indent="0" lvl="0" marL="457200" rtl="0" algn="l">
+              <a:lnSpc>
+                <a:spcPct val="100000"/>
+              </a:lnSpc>
               <a:spcBef>
                 <a:spcPts val="360"/>
               </a:spcBef>
               <a:spcAft>
                 <a:spcPts val="0"/>
               </a:spcAft>
+              <a:buSzPts val="1800"/>
               <a:buNone/>
             </a:pPr>
             <a:r>
@@ -18759,6 +19257,10 @@
           <a:prstGeom prst="rect">
             <a:avLst/>
           </a:prstGeom>
+          <a:noFill/>
+          <a:ln>
+            <a:noFill/>
+          </a:ln>
         </p:spPr>
         <p:txBody>
           <a:bodyPr anchorCtr="0" anchor="ctr" bIns="45700" lIns="91425" spcFirstLastPara="1" rIns="91425" wrap="square" tIns="45700">
@@ -18767,12 +19269,16 @@
           <a:lstStyle/>
           <a:p>
             <a:pPr indent="0" lvl="0" marL="0" rtl="0" algn="ctr">
-              <a:spcBef>
-                <a:spcPts val="0"/>
-              </a:spcBef>
-              <a:spcAft>
-                <a:spcPts val="0"/>
-              </a:spcAft>
+              <a:lnSpc>
+                <a:spcPct val="100000"/>
+              </a:lnSpc>
+              <a:spcBef>
+                <a:spcPts val="0"/>
+              </a:spcBef>
+              <a:spcAft>
+                <a:spcPts val="0"/>
+              </a:spcAft>
+              <a:buSzPts val="1800"/>
               <a:buNone/>
             </a:pPr>
             <a:r>
@@ -18799,31 +19305,21 @@
           <a:prstGeom prst="rect">
             <a:avLst/>
           </a:prstGeom>
+          <a:noFill/>
+          <a:ln>
+            <a:noFill/>
+          </a:ln>
         </p:spPr>
         <p:txBody>
           <a:bodyPr anchorCtr="0" anchor="t" bIns="45700" lIns="91425" spcFirstLastPara="1" rIns="91425" wrap="square" tIns="45700">
-            <a:normAutofit lnSpcReduction="10000"/>
+            <a:normAutofit/>
           </a:bodyPr>
           <a:lstStyle/>
           <a:p>
-            <a:pPr indent="-419100" lvl="0" marL="457200" rtl="0" algn="l">
-              <a:spcBef>
-                <a:spcPts val="360"/>
-              </a:spcBef>
-              <a:spcAft>
-                <a:spcPts val="0"/>
-              </a:spcAft>
-              <a:buSzPts val="3000"/>
-              <a:buChar char="•"/>
-            </a:pPr>
-            <a:r>
-              <a:rPr lang="en-US" sz="3000"/>
-              <a:t>Part 1 due 11/16: Find the idea, find the data, create some preliminary visuals, get feedback from peers.</a:t>
-            </a:r>
-            <a:endParaRPr sz="3000"/>
-          </a:p>
-          <a:p>
             <a:pPr indent="0" lvl="0" marL="0" rtl="0" algn="l">
+              <a:lnSpc>
+                <a:spcPct val="100000"/>
+              </a:lnSpc>
               <a:spcBef>
                 <a:spcPts val="360"/>
               </a:spcBef>
@@ -18839,6 +19335,9 @@
           </a:p>
           <a:p>
             <a:pPr indent="-419100" lvl="0" marL="457200" rtl="0" algn="l">
+              <a:lnSpc>
+                <a:spcPct val="100000"/>
+              </a:lnSpc>
               <a:spcBef>
                 <a:spcPts val="360"/>
               </a:spcBef>
@@ -18850,12 +19349,15 @@
             </a:pPr>
             <a:r>
               <a:rPr lang="en-US" sz="3000"/>
-              <a:t>Part 2 due 12/07: Create an interactive dashboard and present the project to the class.</a:t>
+              <a:t>Part 0 due 10/20: Form the teams</a:t>
             </a:r>
             <a:endParaRPr sz="3000"/>
           </a:p>
           <a:p>
-            <a:pPr indent="0" lvl="0" marL="0" rtl="0" algn="l">
+            <a:pPr indent="0" lvl="0" marL="457200" rtl="0" algn="l">
+              <a:lnSpc>
+                <a:spcPct val="100000"/>
+              </a:lnSpc>
               <a:spcBef>
                 <a:spcPts val="360"/>
               </a:spcBef>
@@ -18871,6 +19373,9 @@
           </a:p>
           <a:p>
             <a:pPr indent="-419100" lvl="0" marL="457200" rtl="0" algn="l">
+              <a:lnSpc>
+                <a:spcPct val="100000"/>
+              </a:lnSpc>
               <a:spcBef>
                 <a:spcPts val="360"/>
               </a:spcBef>
@@ -18882,7 +19387,270 @@
             </a:pPr>
             <a:r>
               <a:rPr lang="en-US" sz="3000"/>
-              <a:t>Your code and your data should be available on a GitHUb repository so that anybody can run your dashboard on their own laptop.</a:t>
+              <a:t>Part 1 due 11/03: Find the idea and the dataset(s).</a:t>
+            </a:r>
+            <a:endParaRPr sz="3000"/>
+          </a:p>
+          <a:p>
+            <a:pPr indent="0" lvl="0" marL="0" rtl="0" algn="l">
+              <a:lnSpc>
+                <a:spcPct val="100000"/>
+              </a:lnSpc>
+              <a:spcBef>
+                <a:spcPts val="360"/>
+              </a:spcBef>
+              <a:spcAft>
+                <a:spcPts val="0"/>
+              </a:spcAft>
+              <a:buSzPts val="1800"/>
+              <a:buNone/>
+            </a:pPr>
+            <a:r>
+              <a:t/>
+            </a:r>
+            <a:endParaRPr sz="3000"/>
+          </a:p>
+          <a:p>
+            <a:pPr indent="-419100" lvl="0" marL="457200" rtl="0" algn="l">
+              <a:lnSpc>
+                <a:spcPct val="100000"/>
+              </a:lnSpc>
+              <a:spcBef>
+                <a:spcPts val="360"/>
+              </a:spcBef>
+              <a:spcAft>
+                <a:spcPts val="0"/>
+              </a:spcAft>
+              <a:buSzPts val="3000"/>
+              <a:buChar char="•"/>
+            </a:pPr>
+            <a:r>
+              <a:rPr lang="en-US" sz="3000"/>
+              <a:t>Part 2 due 11/10: Create (static) preliminary visualizations.</a:t>
+            </a:r>
+            <a:endParaRPr sz="3000"/>
+          </a:p>
+        </p:txBody>
+      </p:sp>
+    </p:spTree>
+  </p:cSld>
+  <p:clrMapOvr>
+    <a:masterClrMapping/>
+  </p:clrMapOvr>
+</p:sld>
+</file>
+
+<file path=ppt/slides/slide19.xml><?xml version="1.0" encoding="utf-8"?>
+<p:sld xmlns:a="http://schemas.openxmlformats.org/drawingml/2006/main" xmlns:r="http://schemas.openxmlformats.org/officeDocument/2006/relationships" xmlns:mc="http://schemas.openxmlformats.org/markup-compatibility/2006" xmlns:mv="urn:schemas-microsoft-com:mac:vml" xmlns:p="http://schemas.openxmlformats.org/presentationml/2006/main" xmlns:c="http://schemas.openxmlformats.org/drawingml/2006/chart" xmlns:dgm="http://schemas.openxmlformats.org/drawingml/2006/diagram" xmlns:o="urn:schemas-microsoft-com:office:office" xmlns:v="urn:schemas-microsoft-com:vml" xmlns:pvml="urn:schemas-microsoft-com:office:powerpoint" xmlns:com="http://schemas.openxmlformats.org/drawingml/2006/compatibility" xmlns:p14="http://schemas.microsoft.com/office/powerpoint/2010/main" xmlns:p15="http://schemas.microsoft.com/office/powerpoint/2012/main" xmlns:ahyp="http://schemas.microsoft.com/office/drawing/2018/hyperlinkcolor">
+  <p:cSld>
+    <p:spTree>
+      <p:nvGrpSpPr>
+        <p:cNvPr id="204" name="Shape 204"/>
+        <p:cNvGrpSpPr/>
+        <p:nvPr/>
+      </p:nvGrpSpPr>
+      <p:grpSpPr>
+        <a:xfrm>
+          <a:off x="0" y="0"/>
+          <a:ext cx="0" cy="0"/>
+          <a:chOff x="0" y="0"/>
+          <a:chExt cx="0" cy="0"/>
+        </a:xfrm>
+      </p:grpSpPr>
+      <p:sp>
+        <p:nvSpPr>
+          <p:cNvPr id="205" name="Google Shape;205;g305414679b0_0_2"/>
+          <p:cNvSpPr txBox="1"/>
+          <p:nvPr>
+            <p:ph type="title"/>
+          </p:nvPr>
+        </p:nvSpPr>
+        <p:spPr>
+          <a:xfrm>
+            <a:off x="457200" y="274638"/>
+            <a:ext cx="8229600" cy="1143000"/>
+          </a:xfrm>
+          <a:prstGeom prst="rect">
+            <a:avLst/>
+          </a:prstGeom>
+          <a:noFill/>
+          <a:ln>
+            <a:noFill/>
+          </a:ln>
+        </p:spPr>
+        <p:txBody>
+          <a:bodyPr anchorCtr="0" anchor="ctr" bIns="45700" lIns="91425" spcFirstLastPara="1" rIns="91425" wrap="square" tIns="45700">
+            <a:normAutofit/>
+          </a:bodyPr>
+          <a:lstStyle/>
+          <a:p>
+            <a:pPr indent="0" lvl="0" marL="0" rtl="0" algn="ctr">
+              <a:lnSpc>
+                <a:spcPct val="100000"/>
+              </a:lnSpc>
+              <a:spcBef>
+                <a:spcPts val="0"/>
+              </a:spcBef>
+              <a:spcAft>
+                <a:spcPts val="0"/>
+              </a:spcAft>
+              <a:buSzPts val="1800"/>
+              <a:buNone/>
+            </a:pPr>
+            <a:r>
+              <a:rPr lang="en-US"/>
+              <a:t>Final project</a:t>
+            </a:r>
+            <a:endParaRPr/>
+          </a:p>
+        </p:txBody>
+      </p:sp>
+      <p:sp>
+        <p:nvSpPr>
+          <p:cNvPr id="206" name="Google Shape;206;g305414679b0_0_2"/>
+          <p:cNvSpPr txBox="1"/>
+          <p:nvPr>
+            <p:ph idx="1" type="body"/>
+          </p:nvPr>
+        </p:nvSpPr>
+        <p:spPr>
+          <a:xfrm>
+            <a:off x="457200" y="1600200"/>
+            <a:ext cx="8229600" cy="4526100"/>
+          </a:xfrm>
+          <a:prstGeom prst="rect">
+            <a:avLst/>
+          </a:prstGeom>
+          <a:noFill/>
+          <a:ln>
+            <a:noFill/>
+          </a:ln>
+        </p:spPr>
+        <p:txBody>
+          <a:bodyPr anchorCtr="0" anchor="t" bIns="45700" lIns="91425" spcFirstLastPara="1" rIns="91425" wrap="square" tIns="45700">
+            <a:normAutofit/>
+          </a:bodyPr>
+          <a:lstStyle/>
+          <a:p>
+            <a:pPr indent="0" lvl="0" marL="0" rtl="0" algn="l">
+              <a:lnSpc>
+                <a:spcPct val="100000"/>
+              </a:lnSpc>
+              <a:spcBef>
+                <a:spcPts val="360"/>
+              </a:spcBef>
+              <a:spcAft>
+                <a:spcPts val="0"/>
+              </a:spcAft>
+              <a:buSzPts val="1800"/>
+              <a:buNone/>
+            </a:pPr>
+            <a:r>
+              <a:t/>
+            </a:r>
+            <a:endParaRPr sz="3000"/>
+          </a:p>
+          <a:p>
+            <a:pPr indent="-419100" lvl="0" marL="457200" rtl="0" algn="l">
+              <a:lnSpc>
+                <a:spcPct val="100000"/>
+              </a:lnSpc>
+              <a:spcBef>
+                <a:spcPts val="360"/>
+              </a:spcBef>
+              <a:spcAft>
+                <a:spcPts val="0"/>
+              </a:spcAft>
+              <a:buSzPts val="3000"/>
+              <a:buChar char="•"/>
+            </a:pPr>
+            <a:r>
+              <a:rPr lang="en-US" sz="3000"/>
+              <a:t>Part 3 due 17/11: Create a preliminary </a:t>
+            </a:r>
+            <a:r>
+              <a:rPr lang="en-US" sz="3000"/>
+              <a:t>dashboard</a:t>
+            </a:r>
+            <a:r>
+              <a:rPr lang="en-US" sz="3000"/>
+              <a:t>.</a:t>
+            </a:r>
+            <a:endParaRPr sz="3000"/>
+          </a:p>
+          <a:p>
+            <a:pPr indent="0" lvl="0" marL="0" rtl="0" algn="l">
+              <a:lnSpc>
+                <a:spcPct val="100000"/>
+              </a:lnSpc>
+              <a:spcBef>
+                <a:spcPts val="360"/>
+              </a:spcBef>
+              <a:spcAft>
+                <a:spcPts val="0"/>
+              </a:spcAft>
+              <a:buNone/>
+            </a:pPr>
+            <a:r>
+              <a:t/>
+            </a:r>
+            <a:endParaRPr sz="3000"/>
+          </a:p>
+          <a:p>
+            <a:pPr indent="-419100" lvl="0" marL="457200" rtl="0" algn="l">
+              <a:lnSpc>
+                <a:spcPct val="100000"/>
+              </a:lnSpc>
+              <a:spcBef>
+                <a:spcPts val="360"/>
+              </a:spcBef>
+              <a:spcAft>
+                <a:spcPts val="0"/>
+              </a:spcAft>
+              <a:buSzPts val="3000"/>
+              <a:buChar char="•"/>
+            </a:pPr>
+            <a:r>
+              <a:rPr lang="en-US" sz="3000"/>
+              <a:t>Part 4 due 11/24: Finalize the dashboard.</a:t>
+            </a:r>
+            <a:endParaRPr sz="3000"/>
+          </a:p>
+          <a:p>
+            <a:pPr indent="0" lvl="0" marL="0" rtl="0" algn="l">
+              <a:lnSpc>
+                <a:spcPct val="100000"/>
+              </a:lnSpc>
+              <a:spcBef>
+                <a:spcPts val="360"/>
+              </a:spcBef>
+              <a:spcAft>
+                <a:spcPts val="0"/>
+              </a:spcAft>
+              <a:buNone/>
+            </a:pPr>
+            <a:r>
+              <a:t/>
+            </a:r>
+            <a:endParaRPr sz="3000"/>
+          </a:p>
+          <a:p>
+            <a:pPr indent="-419100" lvl="0" marL="457200" rtl="0" algn="l">
+              <a:lnSpc>
+                <a:spcPct val="100000"/>
+              </a:lnSpc>
+              <a:spcBef>
+                <a:spcPts val="360"/>
+              </a:spcBef>
+              <a:spcAft>
+                <a:spcPts val="0"/>
+              </a:spcAft>
+              <a:buSzPts val="3000"/>
+              <a:buChar char="•"/>
+            </a:pPr>
+            <a:r>
+              <a:rPr lang="en-US" sz="3000"/>
+              <a:t>Your code and your data should be available on a GitHub repository so that anybody can run your dashboard on their own laptop.</a:t>
             </a:r>
             <a:endParaRPr sz="3000"/>
           </a:p>
@@ -18992,7 +19760,7 @@
           </a:bodyPr>
           <a:lstStyle/>
           <a:p>
-            <a:pPr indent="-355600" lvl="0" marL="342900" rtl="0" algn="l">
+            <a:pPr indent="-342900" lvl="0" marL="342900" rtl="0" algn="l">
               <a:lnSpc>
                 <a:spcPct val="100000"/>
               </a:lnSpc>
@@ -19010,11 +19778,7 @@
             </a:pPr>
             <a:r>
               <a:rPr lang="en-US" sz="3000"/>
-              <a:t>M</a:t>
-            </a:r>
-            <a:r>
-              <a:rPr lang="en-US" sz="3000"/>
-              <a:t>aster in Statistics from University of Washington.</a:t>
+              <a:t>Master in Statistics from University of Washington.</a:t>
             </a:r>
             <a:endParaRPr sz="3000"/>
           </a:p>
@@ -19029,6 +19793,7 @@
               <a:spcAft>
                 <a:spcPts val="0"/>
               </a:spcAft>
+              <a:buSzPts val="1800"/>
               <a:buNone/>
             </a:pPr>
             <a:r>
@@ -19037,7 +19802,7 @@
             <a:endParaRPr sz="3000"/>
           </a:p>
           <a:p>
-            <a:pPr indent="-355600" lvl="0" marL="342900" rtl="0" algn="l">
+            <a:pPr indent="-342900" lvl="0" marL="342900" rtl="0" algn="l">
               <a:lnSpc>
                 <a:spcPct val="100000"/>
               </a:lnSpc>
@@ -19070,6 +19835,7 @@
               <a:spcAft>
                 <a:spcPts val="0"/>
               </a:spcAft>
+              <a:buSzPts val="1800"/>
               <a:buNone/>
             </a:pPr>
             <a:r>
@@ -19078,7 +19844,7 @@
             <a:endParaRPr sz="3000"/>
           </a:p>
           <a:p>
-            <a:pPr indent="-355600" lvl="0" marL="342900" rtl="0" algn="l">
+            <a:pPr indent="-342900" lvl="0" marL="342900" rtl="0" algn="l">
               <a:lnSpc>
                 <a:spcPct val="100000"/>
               </a:lnSpc>
@@ -19093,7 +19859,7 @@
             </a:pPr>
             <a:r>
               <a:rPr lang="en-US" sz="3000"/>
-              <a:t>Starting a postdoc in October at the Institute for Health Metrics and Evaluation.</a:t>
+              <a:t>Postdoc in the Mathematical Sciences team at the Institute for Health Metrics and Evaluation.</a:t>
             </a:r>
             <a:endParaRPr sz="3000"/>
           </a:p>
@@ -19108,6 +19874,7 @@
               <a:spcAft>
                 <a:spcPts val="0"/>
               </a:spcAft>
+              <a:buSzPts val="1800"/>
               <a:buNone/>
             </a:pPr>
             <a:r>
@@ -19116,7 +19883,7 @@
             <a:endParaRPr sz="3000"/>
           </a:p>
           <a:p>
-            <a:pPr indent="-355600" lvl="0" marL="342900" rtl="0" algn="l">
+            <a:pPr indent="-342900" lvl="0" marL="342900" rtl="0" algn="l">
               <a:lnSpc>
                 <a:spcPct val="100000"/>
               </a:lnSpc>
@@ -19208,7 +19975,7 @@
             </a:pPr>
             <a:r>
               <a:rPr lang="en-US"/>
-              <a:t>TA: Trinity Fan</a:t>
+              <a:t>TA: Saksham Jain</a:t>
             </a:r>
             <a:endParaRPr/>
           </a:p>
@@ -19230,135 +19997,90 @@
           <a:prstGeom prst="rect">
             <a:avLst/>
           </a:prstGeom>
+          <a:noFill/>
+          <a:ln>
+            <a:noFill/>
+          </a:ln>
         </p:spPr>
         <p:txBody>
           <a:bodyPr anchorCtr="0" anchor="t" bIns="45700" lIns="91425" spcFirstLastPara="1" rIns="91425" wrap="square" tIns="45700">
-            <a:normAutofit fontScale="92500" lnSpcReduction="20000"/>
+            <a:normAutofit lnSpcReduction="20000"/>
           </a:bodyPr>
           <a:lstStyle/>
           <a:p>
-            <a:pPr indent="-334327" lvl="0" marL="457200" rtl="0" algn="l">
-              <a:spcBef>
-                <a:spcPts val="360"/>
-              </a:spcBef>
-              <a:spcAft>
-                <a:spcPts val="0"/>
-              </a:spcAft>
-              <a:buSzPct val="56250"/>
+            <a:pPr indent="-342900" lvl="0" marL="342900" rtl="0" algn="l">
+              <a:spcBef>
+                <a:spcPts val="0"/>
+              </a:spcBef>
+              <a:spcAft>
+                <a:spcPts val="0"/>
+              </a:spcAft>
+              <a:buSzPts val="3000"/>
               <a:buChar char="•"/>
             </a:pPr>
             <a:r>
-              <a:rPr lang="en-US"/>
-              <a:t>4th year PhD student in Statistics at the University of Washington</a:t>
+              <a:rPr lang="en-US" sz="3000"/>
+              <a:t>Bachelor in Mechanical Engineering: Robotics &amp; Automation from University of Delhi.</a:t>
             </a:r>
-            <a:endParaRPr/>
+            <a:br>
+              <a:rPr lang="en-US" sz="3000"/>
+            </a:br>
+            <a:endParaRPr sz="3000"/>
           </a:p>
           <a:p>
-            <a:pPr indent="0" lvl="0" marL="0" rtl="0" algn="l">
-              <a:spcBef>
-                <a:spcPts val="360"/>
-              </a:spcBef>
-              <a:spcAft>
-                <a:spcPts val="0"/>
-              </a:spcAft>
-              <a:buNone/>
-            </a:pPr>
-            <a:r>
-              <a:t/>
-            </a:r>
-            <a:endParaRPr/>
-          </a:p>
-          <a:p>
-            <a:pPr indent="-334327" lvl="0" marL="457200" rtl="0" algn="l">
-              <a:spcBef>
-                <a:spcPts val="360"/>
-              </a:spcBef>
-              <a:spcAft>
-                <a:spcPts val="0"/>
-              </a:spcAft>
-              <a:buSzPct val="56250"/>
+            <a:pPr indent="-342900" lvl="0" marL="342900" rtl="0" algn="l">
+              <a:spcBef>
+                <a:spcPts val="0"/>
+              </a:spcBef>
+              <a:spcAft>
+                <a:spcPts val="0"/>
+              </a:spcAft>
+              <a:buSzPts val="3000"/>
               <a:buChar char="•"/>
             </a:pPr>
             <a:r>
-              <a:rPr lang="en-US"/>
-              <a:t>Research in active learning under domain shift and designing efficient data strategies.</a:t>
+              <a:rPr lang="en-US" sz="3000"/>
+              <a:t>Master in Electrical and Computer Engineering: Machine Learning from Duke University.</a:t>
             </a:r>
-            <a:endParaRPr/>
+            <a:br>
+              <a:rPr lang="en-US" sz="3000"/>
+            </a:br>
+            <a:endParaRPr sz="3000"/>
           </a:p>
           <a:p>
-            <a:pPr indent="0" lvl="0" marL="0" rtl="0" algn="l">
-              <a:spcBef>
-                <a:spcPts val="360"/>
-              </a:spcBef>
-              <a:spcAft>
-                <a:spcPts val="0"/>
-              </a:spcAft>
-              <a:buNone/>
-            </a:pPr>
-            <a:r>
-              <a:t/>
-            </a:r>
-            <a:endParaRPr/>
-          </a:p>
-          <a:p>
-            <a:pPr indent="-334327" lvl="0" marL="457200" rtl="0" algn="l">
-              <a:spcBef>
-                <a:spcPts val="360"/>
-              </a:spcBef>
-              <a:spcAft>
-                <a:spcPts val="0"/>
-              </a:spcAft>
-              <a:buSzPct val="56250"/>
+            <a:pPr indent="-342900" lvl="0" marL="342900" rtl="0" algn="l">
+              <a:spcBef>
+                <a:spcPts val="0"/>
+              </a:spcBef>
+              <a:spcAft>
+                <a:spcPts val="0"/>
+              </a:spcAft>
+              <a:buSzPts val="3000"/>
               <a:buChar char="•"/>
             </a:pPr>
             <a:r>
-              <a:rPr lang="en-US"/>
-              <a:t>Love photography (data visualization is like taking meaningful photos of the data!)</a:t>
+              <a:rPr lang="en-US" sz="3000"/>
+              <a:t>PhD student in Statistics at the University of Washington.</a:t>
             </a:r>
-            <a:endParaRPr/>
+            <a:br>
+              <a:rPr lang="en-US" sz="3000"/>
+            </a:br>
+            <a:endParaRPr sz="3000"/>
           </a:p>
           <a:p>
-            <a:pPr indent="0" lvl="0" marL="0" rtl="0" algn="l">
-              <a:spcBef>
-                <a:spcPts val="360"/>
-              </a:spcBef>
-              <a:spcAft>
-                <a:spcPts val="0"/>
-              </a:spcAft>
-              <a:buNone/>
+            <a:pPr indent="-342900" lvl="0" marL="342900" rtl="0" algn="l">
+              <a:spcBef>
+                <a:spcPts val="0"/>
+              </a:spcBef>
+              <a:spcAft>
+                <a:spcPts val="0"/>
+              </a:spcAft>
+              <a:buSzPts val="3000"/>
+              <a:buChar char="•"/>
             </a:pPr>
             <a:r>
-              <a:t/>
-            </a:r>
-            <a:endParaRPr/>
-          </a:p>
-          <a:p>
-            <a:pPr indent="0" lvl="0" marL="0" rtl="0" algn="l">
-              <a:spcBef>
-                <a:spcPts val="360"/>
-              </a:spcBef>
-              <a:spcAft>
-                <a:spcPts val="0"/>
-              </a:spcAft>
-              <a:buNone/>
-            </a:pPr>
-            <a:r>
-              <a:t/>
-            </a:r>
-            <a:endParaRPr/>
-          </a:p>
-          <a:p>
-            <a:pPr indent="0" lvl="0" marL="0" rtl="0" algn="l">
-              <a:spcBef>
-                <a:spcPts val="360"/>
-              </a:spcBef>
-              <a:spcAft>
-                <a:spcPts val="0"/>
-              </a:spcAft>
-              <a:buNone/>
-            </a:pPr>
-            <a:r>
-              <a:t/>
+              <a:rPr lang="en-US" sz="3000"/>
+              <a:t>Research interest in causal inference and machine learning.</a:t>
             </a:r>
             <a:endParaRPr/>
           </a:p>
@@ -19457,6 +20179,10 @@
           <a:prstGeom prst="rect">
             <a:avLst/>
           </a:prstGeom>
+          <a:noFill/>
+          <a:ln>
+            <a:noFill/>
+          </a:ln>
         </p:spPr>
         <p:txBody>
           <a:bodyPr anchorCtr="0" anchor="t" bIns="45700" lIns="91425" spcFirstLastPara="1" rIns="91425" wrap="square" tIns="45700">
@@ -19465,6 +20191,9 @@
           <a:lstStyle/>
           <a:p>
             <a:pPr indent="-419100" lvl="0" marL="457200" rtl="0" algn="l">
+              <a:lnSpc>
+                <a:spcPct val="100000"/>
+              </a:lnSpc>
               <a:spcBef>
                 <a:spcPts val="360"/>
               </a:spcBef>
@@ -19482,12 +20211,16 @@
           </a:p>
           <a:p>
             <a:pPr indent="0" lvl="0" marL="0" rtl="0" algn="l">
+              <a:lnSpc>
+                <a:spcPct val="100000"/>
+              </a:lnSpc>
               <a:spcBef>
                 <a:spcPts val="360"/>
               </a:spcBef>
               <a:spcAft>
                 <a:spcPts val="0"/>
               </a:spcAft>
+              <a:buSzPts val="1800"/>
               <a:buNone/>
             </a:pPr>
             <a:r>
@@ -19497,6 +20230,9 @@
           </a:p>
           <a:p>
             <a:pPr indent="-419100" lvl="0" marL="457200" rtl="0" algn="l">
+              <a:lnSpc>
+                <a:spcPct val="100000"/>
+              </a:lnSpc>
               <a:spcBef>
                 <a:spcPts val="360"/>
               </a:spcBef>
@@ -19514,12 +20250,16 @@
           </a:p>
           <a:p>
             <a:pPr indent="0" lvl="0" marL="0" rtl="0" algn="l">
+              <a:lnSpc>
+                <a:spcPct val="100000"/>
+              </a:lnSpc>
               <a:spcBef>
                 <a:spcPts val="360"/>
               </a:spcBef>
               <a:spcAft>
                 <a:spcPts val="0"/>
               </a:spcAft>
+              <a:buSzPts val="1800"/>
               <a:buNone/>
             </a:pPr>
             <a:r>
@@ -19529,6 +20269,9 @@
           </a:p>
           <a:p>
             <a:pPr indent="-419100" lvl="0" marL="457200" rtl="0" algn="l">
+              <a:lnSpc>
+                <a:spcPct val="100000"/>
+              </a:lnSpc>
               <a:spcBef>
                 <a:spcPts val="360"/>
               </a:spcBef>
@@ -19546,12 +20289,16 @@
           </a:p>
           <a:p>
             <a:pPr indent="0" lvl="0" marL="0" rtl="0" algn="l">
+              <a:lnSpc>
+                <a:spcPct val="100000"/>
+              </a:lnSpc>
               <a:spcBef>
                 <a:spcPts val="360"/>
               </a:spcBef>
               <a:spcAft>
                 <a:spcPts val="0"/>
               </a:spcAft>
+              <a:buSzPts val="1800"/>
               <a:buNone/>
             </a:pPr>
             <a:r>
@@ -19561,6 +20308,9 @@
           </a:p>
           <a:p>
             <a:pPr indent="-419100" lvl="0" marL="457200" rtl="0" algn="l">
+              <a:lnSpc>
+                <a:spcPct val="100000"/>
+              </a:lnSpc>
               <a:spcBef>
                 <a:spcPts val="360"/>
               </a:spcBef>
@@ -19671,6 +20421,10 @@
           <a:prstGeom prst="rect">
             <a:avLst/>
           </a:prstGeom>
+          <a:noFill/>
+          <a:ln>
+            <a:noFill/>
+          </a:ln>
         </p:spPr>
         <p:txBody>
           <a:bodyPr anchorCtr="0" anchor="t" bIns="45700" lIns="91425" spcFirstLastPara="1" rIns="91425" wrap="square" tIns="45700">
@@ -19679,6 +20433,9 @@
           <a:lstStyle/>
           <a:p>
             <a:pPr indent="-419100" lvl="0" marL="457200" rtl="0" algn="l">
+              <a:lnSpc>
+                <a:spcPct val="100000"/>
+              </a:lnSpc>
               <a:spcBef>
                 <a:spcPts val="360"/>
               </a:spcBef>
@@ -19696,12 +20453,16 @@
           </a:p>
           <a:p>
             <a:pPr indent="0" lvl="0" marL="0" rtl="0" algn="l">
+              <a:lnSpc>
+                <a:spcPct val="100000"/>
+              </a:lnSpc>
               <a:spcBef>
                 <a:spcPts val="360"/>
               </a:spcBef>
               <a:spcAft>
                 <a:spcPts val="0"/>
               </a:spcAft>
+              <a:buSzPts val="1800"/>
               <a:buNone/>
             </a:pPr>
             <a:r>
@@ -19711,6 +20472,9 @@
           </a:p>
           <a:p>
             <a:pPr indent="-419100" lvl="0" marL="457200" rtl="0" algn="l">
+              <a:lnSpc>
+                <a:spcPct val="100000"/>
+              </a:lnSpc>
               <a:spcBef>
                 <a:spcPts val="360"/>
               </a:spcBef>
@@ -19728,12 +20492,16 @@
           </a:p>
           <a:p>
             <a:pPr indent="0" lvl="0" marL="0" rtl="0" algn="l">
+              <a:lnSpc>
+                <a:spcPct val="100000"/>
+              </a:lnSpc>
               <a:spcBef>
                 <a:spcPts val="360"/>
               </a:spcBef>
               <a:spcAft>
                 <a:spcPts val="0"/>
               </a:spcAft>
+              <a:buSzPts val="1800"/>
               <a:buNone/>
             </a:pPr>
             <a:r>
@@ -19743,6 +20511,9 @@
           </a:p>
           <a:p>
             <a:pPr indent="-419100" lvl="0" marL="457200" rtl="0" algn="l">
+              <a:lnSpc>
+                <a:spcPct val="100000"/>
+              </a:lnSpc>
               <a:spcBef>
                 <a:spcPts val="360"/>
               </a:spcBef>
@@ -19760,12 +20531,16 @@
           </a:p>
           <a:p>
             <a:pPr indent="0" lvl="0" marL="0" rtl="0" algn="l">
+              <a:lnSpc>
+                <a:spcPct val="100000"/>
+              </a:lnSpc>
               <a:spcBef>
                 <a:spcPts val="360"/>
               </a:spcBef>
               <a:spcAft>
                 <a:spcPts val="0"/>
               </a:spcAft>
+              <a:buSzPts val="1800"/>
               <a:buNone/>
             </a:pPr>
             <a:r>
@@ -19784,6 +20559,7 @@
               <a:spcAft>
                 <a:spcPts val="0"/>
               </a:spcAft>
+              <a:buSzPts val="1800"/>
               <a:buNone/>
             </a:pPr>
             <a:r>
@@ -19807,6 +20583,7 @@
               <a:spcAft>
                 <a:spcPts val="0"/>
               </a:spcAft>
+              <a:buSzPts val="1800"/>
               <a:buNone/>
             </a:pPr>
             <a:r>
@@ -19826,6 +20603,7 @@
               <a:spcAft>
                 <a:spcPts val="0"/>
               </a:spcAft>
+              <a:buSzPts val="1800"/>
               <a:buNone/>
             </a:pPr>
             <a:r>
@@ -19929,6 +20707,10 @@
           <a:prstGeom prst="rect">
             <a:avLst/>
           </a:prstGeom>
+          <a:noFill/>
+          <a:ln>
+            <a:noFill/>
+          </a:ln>
         </p:spPr>
         <p:txBody>
           <a:bodyPr anchorCtr="0" anchor="t" bIns="45700" lIns="91425" spcFirstLastPara="1" rIns="91425" wrap="square" tIns="45700">
@@ -19955,7 +20737,25 @@
             </a:r>
             <a:r>
               <a:rPr lang="en-US" sz="3000"/>
-              <a:t> T-Th 10:30-12:20 in CDH 139. Most labs will be done during the Tuesday class.</a:t>
+              <a:t> T-Th 10:30-12:20 in LOW 201.</a:t>
+            </a:r>
+            <a:endParaRPr sz="3000"/>
+          </a:p>
+          <a:p>
+            <a:pPr indent="0" lvl="0" marL="0" rtl="0" algn="just">
+              <a:lnSpc>
+                <a:spcPct val="105000"/>
+              </a:lnSpc>
+              <a:spcBef>
+                <a:spcPts val="1200"/>
+              </a:spcBef>
+              <a:spcAft>
+                <a:spcPts val="0"/>
+              </a:spcAft>
+              <a:buNone/>
+            </a:pPr>
+            <a:r>
+              <a:t/>
             </a:r>
             <a:endParaRPr sz="3000"/>
           </a:p>
@@ -19975,13 +20775,67 @@
             </a:pPr>
             <a:r>
               <a:rPr b="1" lang="en-US" sz="3000"/>
-              <a:t>Offices hours: </a:t>
+              <a:t>Offices hours:</a:t>
             </a:r>
+            <a:endParaRPr b="1" sz="3000"/>
+          </a:p>
+          <a:p>
+            <a:pPr indent="-419100" lvl="1" marL="914400" rtl="0" algn="just">
+              <a:lnSpc>
+                <a:spcPct val="105000"/>
+              </a:lnSpc>
+              <a:spcBef>
+                <a:spcPts val="0"/>
+              </a:spcBef>
+              <a:spcAft>
+                <a:spcPts val="0"/>
+              </a:spcAft>
+              <a:buSzPts val="3000"/>
+              <a:buChar char="–"/>
+            </a:pPr>
             <a:r>
               <a:rPr lang="en-US" sz="3000"/>
-              <a:t>Tu-Th 9:00-10:00 in the Statistics Tutor &amp; Study Center (CMU B-023) (Ariane) and Tu 1:30-2:30, W 2:00-3:00 in Padelford B-224 (Trinity)</a:t>
+              <a:t>Ariane: M-Th 9-10 in the Statistics Tutor and Study Center (Communications Building B-023)</a:t>
             </a:r>
             <a:endParaRPr sz="3000"/>
+          </a:p>
+          <a:p>
+            <a:pPr indent="-419100" lvl="1" marL="914400" rtl="0" algn="just">
+              <a:lnSpc>
+                <a:spcPct val="105000"/>
+              </a:lnSpc>
+              <a:spcBef>
+                <a:spcPts val="0"/>
+              </a:spcBef>
+              <a:spcAft>
+                <a:spcPts val="0"/>
+              </a:spcAft>
+              <a:buSzPts val="3000"/>
+              <a:buChar char="–"/>
+            </a:pPr>
+            <a:r>
+              <a:rPr lang="en-US" sz="3000"/>
+              <a:t>Saksham: TBD</a:t>
+            </a:r>
+            <a:endParaRPr sz="3000"/>
+          </a:p>
+          <a:p>
+            <a:pPr indent="0" lvl="0" marL="0" rtl="0" algn="just">
+              <a:lnSpc>
+                <a:spcPct val="105000"/>
+              </a:lnSpc>
+              <a:spcBef>
+                <a:spcPts val="0"/>
+              </a:spcBef>
+              <a:spcAft>
+                <a:spcPts val="0"/>
+              </a:spcAft>
+              <a:buNone/>
+            </a:pPr>
+            <a:r>
+              <a:t/>
+            </a:r>
+            <a:endParaRPr b="1" sz="3000"/>
           </a:p>
           <a:p>
             <a:pPr indent="-419100" lvl="0" marL="457200" rtl="0" algn="just">
@@ -19999,11 +20853,29 @@
             </a:pPr>
             <a:r>
               <a:rPr b="1" lang="en-US" sz="3000"/>
-              <a:t>Final exam (project presentations):</a:t>
+              <a:t>Final exam (project presentations): </a:t>
             </a:r>
             <a:r>
               <a:rPr lang="en-US" sz="3000"/>
-              <a:t> Monday 12/11 10:30-12:20 in CDH 139</a:t>
+              <a:t>Last week of the quarter (Tu 3rd and Th 5th Dec.)</a:t>
+            </a:r>
+            <a:endParaRPr sz="3000"/>
+          </a:p>
+          <a:p>
+            <a:pPr indent="0" lvl="0" marL="0" rtl="0" algn="just">
+              <a:lnSpc>
+                <a:spcPct val="105000"/>
+              </a:lnSpc>
+              <a:spcBef>
+                <a:spcPts val="0"/>
+              </a:spcBef>
+              <a:spcAft>
+                <a:spcPts val="0"/>
+              </a:spcAft>
+              <a:buNone/>
+            </a:pPr>
+            <a:r>
+              <a:t/>
             </a:r>
             <a:endParaRPr sz="3000"/>
           </a:p>
@@ -20144,6 +21016,7 @@
               <a:spcAft>
                 <a:spcPts val="0"/>
               </a:spcAft>
+              <a:buSzPts val="1800"/>
               <a:buNone/>
             </a:pPr>
             <a:r>
@@ -20183,6 +21056,7 @@
               <a:spcAft>
                 <a:spcPts val="0"/>
               </a:spcAft>
+              <a:buSzPts val="1800"/>
               <a:buNone/>
             </a:pPr>
             <a:r>
@@ -20292,7 +21166,7 @@
         </p:spPr>
         <p:txBody>
           <a:bodyPr anchorCtr="0" anchor="t" bIns="45700" lIns="91425" spcFirstLastPara="1" rIns="91425" wrap="square" tIns="45700">
-            <a:normAutofit lnSpcReduction="10000"/>
+            <a:normAutofit lnSpcReduction="20000"/>
           </a:bodyPr>
           <a:lstStyle/>
           <a:p>
@@ -20327,6 +21201,7 @@
               <a:spcAft>
                 <a:spcPts val="0"/>
               </a:spcAft>
+              <a:buSzPts val="1800"/>
               <a:buNone/>
             </a:pPr>
             <a:r>
@@ -20351,7 +21226,7 @@
             </a:pPr>
             <a:r>
               <a:rPr lang="en-US" sz="3000"/>
-              <a:t>2 homework assignments</a:t>
+              <a:t>2 homework assignments (2 parts for each homework)</a:t>
             </a:r>
             <a:endParaRPr sz="3000"/>
           </a:p>
@@ -20366,6 +21241,7 @@
               <a:spcAft>
                 <a:spcPts val="0"/>
               </a:spcAft>
+              <a:buSzPts val="1800"/>
               <a:buNone/>
             </a:pPr>
             <a:r>
@@ -20390,7 +21266,7 @@
             </a:pPr>
             <a:r>
               <a:rPr lang="en-US" sz="3000"/>
-              <a:t>1 final project</a:t>
+              <a:t>1 final project (in teams)</a:t>
             </a:r>
             <a:endParaRPr sz="3000"/>
           </a:p>
@@ -20405,6 +21281,7 @@
               <a:spcAft>
                 <a:spcPts val="0"/>
               </a:spcAft>
+              <a:buSzPts val="1800"/>
               <a:buNone/>
             </a:pPr>
             <a:r>
@@ -20444,6 +21321,7 @@
               <a:spcAft>
                 <a:spcPts val="0"/>
               </a:spcAft>
+              <a:buSzPts val="1800"/>
               <a:buNone/>
             </a:pPr>
             <a:r>
@@ -20462,6 +21340,7 @@
               <a:spcAft>
                 <a:spcPts val="0"/>
               </a:spcAft>
+              <a:buSzPts val="1800"/>
               <a:buNone/>
             </a:pPr>
             <a:r>
@@ -20607,6 +21486,7 @@
               <a:spcAft>
                 <a:spcPts val="0"/>
               </a:spcAft>
+              <a:buSzPts val="1800"/>
               <a:buNone/>
             </a:pPr>
             <a:r>
@@ -20646,6 +21526,7 @@
               <a:spcAft>
                 <a:spcPts val="0"/>
               </a:spcAft>
+              <a:buSzPts val="1800"/>
               <a:buNone/>
             </a:pPr>
             <a:r>
@@ -20685,6 +21566,7 @@
               <a:spcAft>
                 <a:spcPts val="0"/>
               </a:spcAft>
+              <a:buSzPts val="1800"/>
               <a:buNone/>
             </a:pPr>
             <a:r>

</xml_diff>